<commit_message>
updated image mgmt lld
</commit_message>
<xml_diff>
--- a/MECM PT/Release V1.1/Image Management-LLD.pptx
+++ b/MECM PT/Release V1.1/Image Management-LLD.pptx
@@ -19,6 +19,8 @@
     <p:sldId id="264" r:id="rId15"/>
     <p:sldId id="265" r:id="rId16"/>
     <p:sldId id="266" r:id="rId17"/>
+    <p:sldId id="267" r:id="rId18"/>
+    <p:sldId id="268" r:id="rId19"/>
   </p:sldIdLst>
   <p:sldSz cy="5143500" cx="9144000"/>
   <p:notesSz cx="6858000" cy="9144000"/>
@@ -800,7 +802,7 @@
   <p:cSld>
     <p:spTree>
       <p:nvGrpSpPr>
-        <p:cNvPr id="123" name="Shape 123"/>
+        <p:cNvPr id="127" name="Shape 127"/>
         <p:cNvGrpSpPr/>
         <p:nvPr/>
       </p:nvGrpSpPr>
@@ -814,7 +816,7 @@
       </p:grpSpPr>
       <p:sp>
         <p:nvSpPr>
-          <p:cNvPr id="124" name="Google Shape;124;gb5f49f7757_0_95:notes"/>
+          <p:cNvPr id="128" name="Google Shape;128;gb5f49f7757_0_71:notes"/>
           <p:cNvSpPr/>
           <p:nvPr>
             <p:ph idx="2" type="sldImg"/>
@@ -849,7 +851,7 @@
       </p:sp>
       <p:sp>
         <p:nvSpPr>
-          <p:cNvPr id="125" name="Google Shape;125;gb5f49f7757_0_95:notes"/>
+          <p:cNvPr id="129" name="Google Shape;129;gb5f49f7757_0_71:notes"/>
           <p:cNvSpPr txBox="1"/>
           <p:nvPr>
             <p:ph idx="1" type="body"/>
@@ -899,7 +901,7 @@
   <p:cSld>
     <p:spTree>
       <p:nvGrpSpPr>
-        <p:cNvPr id="128" name="Shape 128"/>
+        <p:cNvPr id="132" name="Shape 132"/>
         <p:cNvGrpSpPr/>
         <p:nvPr/>
       </p:nvGrpSpPr>
@@ -913,7 +915,7 @@
       </p:grpSpPr>
       <p:sp>
         <p:nvSpPr>
-          <p:cNvPr id="129" name="Google Shape;129;gb5f49f7757_0_100:notes"/>
+          <p:cNvPr id="133" name="Google Shape;133;gb5f49f7757_0_90:notes"/>
           <p:cNvSpPr/>
           <p:nvPr>
             <p:ph idx="2" type="sldImg"/>
@@ -948,7 +950,205 @@
       </p:sp>
       <p:sp>
         <p:nvSpPr>
-          <p:cNvPr id="130" name="Google Shape;130;gb5f49f7757_0_100:notes"/>
+          <p:cNvPr id="134" name="Google Shape;134;gb5f49f7757_0_90:notes"/>
+          <p:cNvSpPr txBox="1"/>
+          <p:nvPr>
+            <p:ph idx="1" type="body"/>
+          </p:nvPr>
+        </p:nvSpPr>
+        <p:spPr>
+          <a:xfrm>
+            <a:off x="685800" y="4343400"/>
+            <a:ext cx="5486400" cy="4114800"/>
+          </a:xfrm>
+          <a:prstGeom prst="rect">
+            <a:avLst/>
+          </a:prstGeom>
+        </p:spPr>
+        <p:txBody>
+          <a:bodyPr anchorCtr="0" anchor="t" bIns="91425" lIns="91425" spcFirstLastPara="1" rIns="91425" wrap="square" tIns="91425">
+            <a:noAutofit/>
+          </a:bodyPr>
+          <a:lstStyle/>
+          <a:p>
+            <a:pPr indent="0" lvl="0" marL="0" rtl="0" algn="l">
+              <a:spcBef>
+                <a:spcPts val="0"/>
+              </a:spcBef>
+              <a:spcAft>
+                <a:spcPts val="0"/>
+              </a:spcAft>
+              <a:buNone/>
+            </a:pPr>
+            <a:r>
+              <a:t/>
+            </a:r>
+            <a:endParaRPr/>
+          </a:p>
+        </p:txBody>
+      </p:sp>
+    </p:spTree>
+  </p:cSld>
+  <p:clrMapOvr>
+    <a:masterClrMapping/>
+  </p:clrMapOvr>
+</p:notes>
+</file>
+
+<file path=ppt/notesSlides/notesSlide12.xml><?xml version="1.0" encoding="utf-8"?>
+<p:notes xmlns:a="http://schemas.openxmlformats.org/drawingml/2006/main" xmlns:r="http://schemas.openxmlformats.org/officeDocument/2006/relationships" xmlns:mc="http://schemas.openxmlformats.org/markup-compatibility/2006" xmlns:mv="urn:schemas-microsoft-com:mac:vml" xmlns:p="http://schemas.openxmlformats.org/presentationml/2006/main" xmlns:c="http://schemas.openxmlformats.org/drawingml/2006/chart" xmlns:dgm="http://schemas.openxmlformats.org/drawingml/2006/diagram" xmlns:o="urn:schemas-microsoft-com:office:office" xmlns:v="urn:schemas-microsoft-com:vml" xmlns:pvml="urn:schemas-microsoft-com:office:powerpoint" xmlns:com="http://schemas.openxmlformats.org/drawingml/2006/compatibility" xmlns:p14="http://schemas.microsoft.com/office/powerpoint/2010/main" xmlns:p15="http://schemas.microsoft.com/office/powerpoint/2012/main" xmlns:ahyp="http://schemas.microsoft.com/office/drawing/2018/hyperlinkcolor" showMasterPhAnim="0" showMasterSp="0">
+  <p:cSld>
+    <p:spTree>
+      <p:nvGrpSpPr>
+        <p:cNvPr id="137" name="Shape 137"/>
+        <p:cNvGrpSpPr/>
+        <p:nvPr/>
+      </p:nvGrpSpPr>
+      <p:grpSpPr>
+        <a:xfrm>
+          <a:off x="0" y="0"/>
+          <a:ext cx="0" cy="0"/>
+          <a:chOff x="0" y="0"/>
+          <a:chExt cx="0" cy="0"/>
+        </a:xfrm>
+      </p:grpSpPr>
+      <p:sp>
+        <p:nvSpPr>
+          <p:cNvPr id="138" name="Google Shape;138;gb5f49f7757_0_95:notes"/>
+          <p:cNvSpPr/>
+          <p:nvPr>
+            <p:ph idx="2" type="sldImg"/>
+          </p:nvPr>
+        </p:nvSpPr>
+        <p:spPr>
+          <a:xfrm>
+            <a:off x="381300" y="685800"/>
+            <a:ext cx="6096000" cy="3429000"/>
+          </a:xfrm>
+          <a:custGeom>
+            <a:rect b="b" l="l" r="r" t="t"/>
+            <a:pathLst>
+              <a:path extrusionOk="0" h="120000" w="120000">
+                <a:moveTo>
+                  <a:pt x="0" y="0"/>
+                </a:moveTo>
+                <a:lnTo>
+                  <a:pt x="120000" y="0"/>
+                </a:lnTo>
+                <a:lnTo>
+                  <a:pt x="120000" y="120000"/>
+                </a:lnTo>
+                <a:lnTo>
+                  <a:pt x="0" y="120000"/>
+                </a:lnTo>
+                <a:close/>
+              </a:path>
+            </a:pathLst>
+          </a:custGeom>
+        </p:spPr>
+      </p:sp>
+      <p:sp>
+        <p:nvSpPr>
+          <p:cNvPr id="139" name="Google Shape;139;gb5f49f7757_0_95:notes"/>
+          <p:cNvSpPr txBox="1"/>
+          <p:nvPr>
+            <p:ph idx="1" type="body"/>
+          </p:nvPr>
+        </p:nvSpPr>
+        <p:spPr>
+          <a:xfrm>
+            <a:off x="685800" y="4343400"/>
+            <a:ext cx="5486400" cy="4114800"/>
+          </a:xfrm>
+          <a:prstGeom prst="rect">
+            <a:avLst/>
+          </a:prstGeom>
+        </p:spPr>
+        <p:txBody>
+          <a:bodyPr anchorCtr="0" anchor="t" bIns="91425" lIns="91425" spcFirstLastPara="1" rIns="91425" wrap="square" tIns="91425">
+            <a:noAutofit/>
+          </a:bodyPr>
+          <a:lstStyle/>
+          <a:p>
+            <a:pPr indent="0" lvl="0" marL="0" rtl="0" algn="l">
+              <a:spcBef>
+                <a:spcPts val="0"/>
+              </a:spcBef>
+              <a:spcAft>
+                <a:spcPts val="0"/>
+              </a:spcAft>
+              <a:buNone/>
+            </a:pPr>
+            <a:r>
+              <a:t/>
+            </a:r>
+            <a:endParaRPr/>
+          </a:p>
+        </p:txBody>
+      </p:sp>
+    </p:spTree>
+  </p:cSld>
+  <p:clrMapOvr>
+    <a:masterClrMapping/>
+  </p:clrMapOvr>
+</p:notes>
+</file>
+
+<file path=ppt/notesSlides/notesSlide13.xml><?xml version="1.0" encoding="utf-8"?>
+<p:notes xmlns:a="http://schemas.openxmlformats.org/drawingml/2006/main" xmlns:r="http://schemas.openxmlformats.org/officeDocument/2006/relationships" xmlns:mc="http://schemas.openxmlformats.org/markup-compatibility/2006" xmlns:mv="urn:schemas-microsoft-com:mac:vml" xmlns:p="http://schemas.openxmlformats.org/presentationml/2006/main" xmlns:c="http://schemas.openxmlformats.org/drawingml/2006/chart" xmlns:dgm="http://schemas.openxmlformats.org/drawingml/2006/diagram" xmlns:o="urn:schemas-microsoft-com:office:office" xmlns:v="urn:schemas-microsoft-com:vml" xmlns:pvml="urn:schemas-microsoft-com:office:powerpoint" xmlns:com="http://schemas.openxmlformats.org/drawingml/2006/compatibility" xmlns:p14="http://schemas.microsoft.com/office/powerpoint/2010/main" xmlns:p15="http://schemas.microsoft.com/office/powerpoint/2012/main" xmlns:ahyp="http://schemas.microsoft.com/office/drawing/2018/hyperlinkcolor" showMasterPhAnim="0" showMasterSp="0">
+  <p:cSld>
+    <p:spTree>
+      <p:nvGrpSpPr>
+        <p:cNvPr id="142" name="Shape 142"/>
+        <p:cNvGrpSpPr/>
+        <p:nvPr/>
+      </p:nvGrpSpPr>
+      <p:grpSpPr>
+        <a:xfrm>
+          <a:off x="0" y="0"/>
+          <a:ext cx="0" cy="0"/>
+          <a:chOff x="0" y="0"/>
+          <a:chExt cx="0" cy="0"/>
+        </a:xfrm>
+      </p:grpSpPr>
+      <p:sp>
+        <p:nvSpPr>
+          <p:cNvPr id="143" name="Google Shape;143;gb5f49f7757_0_100:notes"/>
+          <p:cNvSpPr/>
+          <p:nvPr>
+            <p:ph idx="2" type="sldImg"/>
+          </p:nvPr>
+        </p:nvSpPr>
+        <p:spPr>
+          <a:xfrm>
+            <a:off x="381300" y="685800"/>
+            <a:ext cx="6096000" cy="3429000"/>
+          </a:xfrm>
+          <a:custGeom>
+            <a:rect b="b" l="l" r="r" t="t"/>
+            <a:pathLst>
+              <a:path extrusionOk="0" h="120000" w="120000">
+                <a:moveTo>
+                  <a:pt x="0" y="0"/>
+                </a:moveTo>
+                <a:lnTo>
+                  <a:pt x="120000" y="0"/>
+                </a:lnTo>
+                <a:lnTo>
+                  <a:pt x="120000" y="120000"/>
+                </a:lnTo>
+                <a:lnTo>
+                  <a:pt x="0" y="120000"/>
+                </a:lnTo>
+                <a:close/>
+              </a:path>
+            </a:pathLst>
+          </a:custGeom>
+        </p:spPr>
+      </p:sp>
+      <p:sp>
+        <p:nvSpPr>
+          <p:cNvPr id="144" name="Google Shape;144;gb5f49f7757_0_100:notes"/>
           <p:cNvSpPr txBox="1"/>
           <p:nvPr>
             <p:ph idx="1" type="body"/>
@@ -1111,7 +1311,7 @@
       </p:grpSpPr>
       <p:sp>
         <p:nvSpPr>
-          <p:cNvPr id="71" name="Google Shape;71;gb5e679f592_0_31:notes"/>
+          <p:cNvPr id="71" name="Google Shape;71;gb5f49f7757_0_125:notes"/>
           <p:cNvSpPr/>
           <p:nvPr>
             <p:ph idx="2" type="sldImg"/>
@@ -1146,7 +1346,7 @@
       </p:sp>
       <p:sp>
         <p:nvSpPr>
-          <p:cNvPr id="72" name="Google Shape;72;gb5e679f592_0_31:notes"/>
+          <p:cNvPr id="72" name="Google Shape;72;gb5f49f7757_0_125:notes"/>
           <p:cNvSpPr txBox="1"/>
           <p:nvPr>
             <p:ph idx="1" type="body"/>
@@ -1196,7 +1396,7 @@
   <p:cSld>
     <p:spTree>
       <p:nvGrpSpPr>
-        <p:cNvPr id="80" name="Shape 80"/>
+        <p:cNvPr id="78" name="Shape 78"/>
         <p:cNvGrpSpPr/>
         <p:nvPr/>
       </p:nvGrpSpPr>
@@ -1210,7 +1410,7 @@
       </p:grpSpPr>
       <p:sp>
         <p:nvSpPr>
-          <p:cNvPr id="81" name="Google Shape;81;gb5f49f7757_0_1:notes"/>
+          <p:cNvPr id="79" name="Google Shape;79;gb5e679f592_0_31:notes"/>
           <p:cNvSpPr/>
           <p:nvPr>
             <p:ph idx="2" type="sldImg"/>
@@ -1245,7 +1445,7 @@
       </p:sp>
       <p:sp>
         <p:nvSpPr>
-          <p:cNvPr id="82" name="Google Shape;82;gb5f49f7757_0_1:notes"/>
+          <p:cNvPr id="80" name="Google Shape;80;gb5e679f592_0_31:notes"/>
           <p:cNvSpPr txBox="1"/>
           <p:nvPr>
             <p:ph idx="1" type="body"/>
@@ -1295,7 +1495,7 @@
   <p:cSld>
     <p:spTree>
       <p:nvGrpSpPr>
-        <p:cNvPr id="85" name="Shape 85"/>
+        <p:cNvPr id="88" name="Shape 88"/>
         <p:cNvGrpSpPr/>
         <p:nvPr/>
       </p:nvGrpSpPr>
@@ -1309,7 +1509,7 @@
       </p:grpSpPr>
       <p:sp>
         <p:nvSpPr>
-          <p:cNvPr id="86" name="Google Shape;86;gb5f49f7757_0_17:notes"/>
+          <p:cNvPr id="89" name="Google Shape;89;gb5f49f7757_0_116:notes"/>
           <p:cNvSpPr/>
           <p:nvPr>
             <p:ph idx="2" type="sldImg"/>
@@ -1344,7 +1544,7 @@
       </p:sp>
       <p:sp>
         <p:nvSpPr>
-          <p:cNvPr id="87" name="Google Shape;87;gb5f49f7757_0_17:notes"/>
+          <p:cNvPr id="90" name="Google Shape;90;gb5f49f7757_0_116:notes"/>
           <p:cNvSpPr txBox="1"/>
           <p:nvPr>
             <p:ph idx="1" type="body"/>
@@ -1394,7 +1594,7 @@
   <p:cSld>
     <p:spTree>
       <p:nvGrpSpPr>
-        <p:cNvPr id="97" name="Shape 97"/>
+        <p:cNvPr id="94" name="Shape 94"/>
         <p:cNvGrpSpPr/>
         <p:nvPr/>
       </p:nvGrpSpPr>
@@ -1408,7 +1608,7 @@
       </p:grpSpPr>
       <p:sp>
         <p:nvSpPr>
-          <p:cNvPr id="98" name="Google Shape;98;gb5f49f7757_0_66:notes"/>
+          <p:cNvPr id="95" name="Google Shape;95;gb5f49f7757_0_1:notes"/>
           <p:cNvSpPr/>
           <p:nvPr>
             <p:ph idx="2" type="sldImg"/>
@@ -1443,7 +1643,7 @@
       </p:sp>
       <p:sp>
         <p:nvSpPr>
-          <p:cNvPr id="99" name="Google Shape;99;gb5f49f7757_0_66:notes"/>
+          <p:cNvPr id="96" name="Google Shape;96;gb5f49f7757_0_1:notes"/>
           <p:cNvSpPr txBox="1"/>
           <p:nvPr>
             <p:ph idx="1" type="body"/>
@@ -1493,7 +1693,7 @@
   <p:cSld>
     <p:spTree>
       <p:nvGrpSpPr>
-        <p:cNvPr id="102" name="Shape 102"/>
+        <p:cNvPr id="99" name="Shape 99"/>
         <p:cNvGrpSpPr/>
         <p:nvPr/>
       </p:nvGrpSpPr>
@@ -1507,7 +1707,7 @@
       </p:grpSpPr>
       <p:sp>
         <p:nvSpPr>
-          <p:cNvPr id="103" name="Google Shape;103;gb5f49f7757_0_51:notes"/>
+          <p:cNvPr id="100" name="Google Shape;100;gb5f49f7757_0_17:notes"/>
           <p:cNvSpPr/>
           <p:nvPr>
             <p:ph idx="2" type="sldImg"/>
@@ -1542,7 +1742,7 @@
       </p:sp>
       <p:sp>
         <p:nvSpPr>
-          <p:cNvPr id="104" name="Google Shape;104;gb5f49f7757_0_51:notes"/>
+          <p:cNvPr id="101" name="Google Shape;101;gb5f49f7757_0_17:notes"/>
           <p:cNvSpPr txBox="1"/>
           <p:nvPr>
             <p:ph idx="1" type="body"/>
@@ -1592,7 +1792,7 @@
   <p:cSld>
     <p:spTree>
       <p:nvGrpSpPr>
-        <p:cNvPr id="113" name="Shape 113"/>
+        <p:cNvPr id="111" name="Shape 111"/>
         <p:cNvGrpSpPr/>
         <p:nvPr/>
       </p:nvGrpSpPr>
@@ -1606,7 +1806,7 @@
       </p:grpSpPr>
       <p:sp>
         <p:nvSpPr>
-          <p:cNvPr id="114" name="Google Shape;114;gb5f49f7757_0_71:notes"/>
+          <p:cNvPr id="112" name="Google Shape;112;gb5f49f7757_0_66:notes"/>
           <p:cNvSpPr/>
           <p:nvPr>
             <p:ph idx="2" type="sldImg"/>
@@ -1641,7 +1841,7 @@
       </p:sp>
       <p:sp>
         <p:nvSpPr>
-          <p:cNvPr id="115" name="Google Shape;115;gb5f49f7757_0_71:notes"/>
+          <p:cNvPr id="113" name="Google Shape;113;gb5f49f7757_0_66:notes"/>
           <p:cNvSpPr txBox="1"/>
           <p:nvPr>
             <p:ph idx="1" type="body"/>
@@ -1691,7 +1891,7 @@
   <p:cSld>
     <p:spTree>
       <p:nvGrpSpPr>
-        <p:cNvPr id="118" name="Shape 118"/>
+        <p:cNvPr id="116" name="Shape 116"/>
         <p:cNvGrpSpPr/>
         <p:nvPr/>
       </p:nvGrpSpPr>
@@ -1705,7 +1905,7 @@
       </p:grpSpPr>
       <p:sp>
         <p:nvSpPr>
-          <p:cNvPr id="119" name="Google Shape;119;gb5f49f7757_0_90:notes"/>
+          <p:cNvPr id="117" name="Google Shape;117;gb5f49f7757_0_51:notes"/>
           <p:cNvSpPr/>
           <p:nvPr>
             <p:ph idx="2" type="sldImg"/>
@@ -1740,7 +1940,7 @@
       </p:sp>
       <p:sp>
         <p:nvSpPr>
-          <p:cNvPr id="120" name="Google Shape;120;gb5f49f7757_0_90:notes"/>
+          <p:cNvPr id="118" name="Google Shape;118;gb5f49f7757_0_51:notes"/>
           <p:cNvSpPr txBox="1"/>
           <p:nvPr>
             <p:ph idx="1" type="body"/>
@@ -6543,7 +6743,7 @@
   <p:cSld>
     <p:spTree>
       <p:nvGrpSpPr>
-        <p:cNvPr id="126" name="Shape 126"/>
+        <p:cNvPr id="130" name="Shape 130"/>
         <p:cNvGrpSpPr/>
         <p:nvPr/>
       </p:nvGrpSpPr>
@@ -6557,7 +6757,385 @@
       </p:grpSpPr>
       <p:sp>
         <p:nvSpPr>
-          <p:cNvPr id="127" name="Google Shape;127;p22"/>
+          <p:cNvPr id="131" name="Google Shape;131;p22"/>
+          <p:cNvSpPr txBox="1"/>
+          <p:nvPr/>
+        </p:nvSpPr>
+        <p:spPr>
+          <a:xfrm>
+            <a:off x="270125" y="310650"/>
+            <a:ext cx="8374200" cy="4494600"/>
+          </a:xfrm>
+          <a:prstGeom prst="rect">
+            <a:avLst/>
+          </a:prstGeom>
+          <a:noFill/>
+          <a:ln>
+            <a:noFill/>
+          </a:ln>
+        </p:spPr>
+        <p:txBody>
+          <a:bodyPr anchorCtr="0" anchor="t" bIns="91425" lIns="91425" spcFirstLastPara="1" rIns="91425" wrap="square" tIns="91425">
+            <a:spAutoFit/>
+          </a:bodyPr>
+          <a:lstStyle/>
+          <a:p>
+            <a:pPr indent="0" lvl="0" marL="0" rtl="0" algn="l">
+              <a:spcBef>
+                <a:spcPts val="0"/>
+              </a:spcBef>
+              <a:spcAft>
+                <a:spcPts val="0"/>
+              </a:spcAft>
+              <a:buNone/>
+            </a:pPr>
+            <a:r>
+              <a:rPr lang="en"/>
+              <a:t>2. Delete image in repo scenario:</a:t>
+            </a:r>
+            <a:endParaRPr/>
+          </a:p>
+          <a:p>
+            <a:pPr indent="0" lvl="0" marL="0" rtl="0" algn="l">
+              <a:spcBef>
+                <a:spcPts val="0"/>
+              </a:spcBef>
+              <a:spcAft>
+                <a:spcPts val="0"/>
+              </a:spcAft>
+              <a:buNone/>
+            </a:pPr>
+            <a:r>
+              <a:rPr lang="en"/>
+              <a:t>How to delete docker images in MECM repo when image is used by some other application package</a:t>
+            </a:r>
+            <a:endParaRPr/>
+          </a:p>
+          <a:p>
+            <a:pPr indent="0" lvl="0" marL="0" rtl="0" algn="l">
+              <a:spcBef>
+                <a:spcPts val="0"/>
+              </a:spcBef>
+              <a:spcAft>
+                <a:spcPts val="0"/>
+              </a:spcAft>
+              <a:buNone/>
+            </a:pPr>
+            <a:r>
+              <a:rPr lang="en"/>
+              <a:t> Possible soln: maintain count for docker image used by application packages. </a:t>
+            </a:r>
+            <a:endParaRPr/>
+          </a:p>
+          <a:p>
+            <a:pPr indent="0" lvl="0" marL="0" rtl="0" algn="l">
+              <a:spcBef>
+                <a:spcPts val="0"/>
+              </a:spcBef>
+              <a:spcAft>
+                <a:spcPts val="0"/>
+              </a:spcAft>
+              <a:buNone/>
+            </a:pPr>
+            <a:r>
+              <a:t/>
+            </a:r>
+            <a:endParaRPr/>
+          </a:p>
+          <a:p>
+            <a:pPr indent="0" lvl="0" marL="0" rtl="0" algn="l">
+              <a:spcBef>
+                <a:spcPts val="0"/>
+              </a:spcBef>
+              <a:spcAft>
+                <a:spcPts val="0"/>
+              </a:spcAft>
+              <a:buNone/>
+            </a:pPr>
+            <a:r>
+              <a:t/>
+            </a:r>
+            <a:endParaRPr/>
+          </a:p>
+          <a:p>
+            <a:pPr indent="0" lvl="0" marL="0" rtl="0" algn="l">
+              <a:spcBef>
+                <a:spcPts val="0"/>
+              </a:spcBef>
+              <a:spcAft>
+                <a:spcPts val="0"/>
+              </a:spcAft>
+              <a:buNone/>
+            </a:pPr>
+            <a:r>
+              <a:t/>
+            </a:r>
+            <a:endParaRPr/>
+          </a:p>
+          <a:p>
+            <a:pPr indent="0" lvl="0" marL="0" rtl="0" algn="l">
+              <a:spcBef>
+                <a:spcPts val="0"/>
+              </a:spcBef>
+              <a:spcAft>
+                <a:spcPts val="0"/>
+              </a:spcAft>
+              <a:buNone/>
+            </a:pPr>
+            <a:r>
+              <a:t/>
+            </a:r>
+            <a:endParaRPr/>
+          </a:p>
+          <a:p>
+            <a:pPr indent="0" lvl="0" marL="0" rtl="0" algn="l">
+              <a:spcBef>
+                <a:spcPts val="0"/>
+              </a:spcBef>
+              <a:spcAft>
+                <a:spcPts val="0"/>
+              </a:spcAft>
+              <a:buNone/>
+            </a:pPr>
+            <a:r>
+              <a:rPr lang="en"/>
+              <a:t>3. mechanism to store app store repo password in DB:</a:t>
+            </a:r>
+            <a:endParaRPr/>
+          </a:p>
+          <a:p>
+            <a:pPr indent="0" lvl="0" marL="0" rtl="0" algn="l">
+              <a:spcBef>
+                <a:spcPts val="0"/>
+              </a:spcBef>
+              <a:spcAft>
+                <a:spcPts val="0"/>
+              </a:spcAft>
+              <a:buNone/>
+            </a:pPr>
+            <a:r>
+              <a:rPr lang="en"/>
+              <a:t>How to get master key used to encrypt/decrypt app store repo password</a:t>
+            </a:r>
+            <a:endParaRPr/>
+          </a:p>
+          <a:p>
+            <a:pPr indent="0" lvl="0" marL="0" rtl="0" algn="l">
+              <a:spcBef>
+                <a:spcPts val="0"/>
+              </a:spcBef>
+              <a:spcAft>
+                <a:spcPts val="0"/>
+              </a:spcAft>
+              <a:buNone/>
+            </a:pPr>
+            <a:r>
+              <a:t/>
+            </a:r>
+            <a:endParaRPr/>
+          </a:p>
+          <a:p>
+            <a:pPr indent="0" lvl="0" marL="0" rtl="0" algn="l">
+              <a:spcBef>
+                <a:spcPts val="0"/>
+              </a:spcBef>
+              <a:spcAft>
+                <a:spcPts val="0"/>
+              </a:spcAft>
+              <a:buNone/>
+            </a:pPr>
+            <a:r>
+              <a:t/>
+            </a:r>
+            <a:endParaRPr/>
+          </a:p>
+          <a:p>
+            <a:pPr indent="0" lvl="0" marL="0" rtl="0" algn="l">
+              <a:spcBef>
+                <a:spcPts val="0"/>
+              </a:spcBef>
+              <a:spcAft>
+                <a:spcPts val="0"/>
+              </a:spcAft>
+              <a:buNone/>
+            </a:pPr>
+            <a:r>
+              <a:t/>
+            </a:r>
+            <a:endParaRPr/>
+          </a:p>
+          <a:p>
+            <a:pPr indent="0" lvl="0" marL="0" rtl="0" algn="l">
+              <a:spcBef>
+                <a:spcPts val="0"/>
+              </a:spcBef>
+              <a:spcAft>
+                <a:spcPts val="0"/>
+              </a:spcAft>
+              <a:buNone/>
+            </a:pPr>
+            <a:r>
+              <a:rPr lang="en">
+                <a:solidFill>
+                  <a:schemeClr val="dk1"/>
+                </a:solidFill>
+              </a:rPr>
+              <a:t>4. </a:t>
+            </a:r>
+            <a:r>
+              <a:rPr lang="en">
+                <a:solidFill>
+                  <a:schemeClr val="dk1"/>
+                </a:solidFill>
+              </a:rPr>
+              <a:t>mechanism to store MECM repo password in APM</a:t>
+            </a:r>
+            <a:endParaRPr>
+              <a:solidFill>
+                <a:schemeClr val="dk1"/>
+              </a:solidFill>
+            </a:endParaRPr>
+          </a:p>
+          <a:p>
+            <a:pPr indent="0" lvl="0" marL="0" rtl="0" algn="l">
+              <a:spcBef>
+                <a:spcPts val="0"/>
+              </a:spcBef>
+              <a:spcAft>
+                <a:spcPts val="0"/>
+              </a:spcAft>
+              <a:buNone/>
+            </a:pPr>
+            <a:r>
+              <a:rPr lang="en">
+                <a:solidFill>
+                  <a:schemeClr val="dk1"/>
+                </a:solidFill>
+              </a:rPr>
+              <a:t>APM communicate with MECM repo, how to  get masterkey and password and how to store ? </a:t>
+            </a:r>
+            <a:endParaRPr>
+              <a:solidFill>
+                <a:schemeClr val="dk1"/>
+              </a:solidFill>
+            </a:endParaRPr>
+          </a:p>
+          <a:p>
+            <a:pPr indent="0" lvl="0" marL="0" rtl="0" algn="l">
+              <a:spcBef>
+                <a:spcPts val="0"/>
+              </a:spcBef>
+              <a:spcAft>
+                <a:spcPts val="0"/>
+              </a:spcAft>
+              <a:buNone/>
+            </a:pPr>
+            <a:r>
+              <a:t/>
+            </a:r>
+            <a:endParaRPr>
+              <a:solidFill>
+                <a:schemeClr val="dk1"/>
+              </a:solidFill>
+            </a:endParaRPr>
+          </a:p>
+          <a:p>
+            <a:pPr indent="0" lvl="0" marL="0" rtl="0" algn="l">
+              <a:spcBef>
+                <a:spcPts val="0"/>
+              </a:spcBef>
+              <a:spcAft>
+                <a:spcPts val="0"/>
+              </a:spcAft>
+              <a:buNone/>
+            </a:pPr>
+            <a:r>
+              <a:t/>
+            </a:r>
+            <a:endParaRPr>
+              <a:solidFill>
+                <a:schemeClr val="dk1"/>
+              </a:solidFill>
+            </a:endParaRPr>
+          </a:p>
+          <a:p>
+            <a:pPr indent="0" lvl="0" marL="0" rtl="0" algn="l">
+              <a:spcBef>
+                <a:spcPts val="0"/>
+              </a:spcBef>
+              <a:spcAft>
+                <a:spcPts val="0"/>
+              </a:spcAft>
+              <a:buNone/>
+            </a:pPr>
+            <a:r>
+              <a:t/>
+            </a:r>
+            <a:endParaRPr>
+              <a:solidFill>
+                <a:schemeClr val="dk1"/>
+              </a:solidFill>
+            </a:endParaRPr>
+          </a:p>
+          <a:p>
+            <a:pPr indent="0" lvl="0" marL="0" rtl="0" algn="l">
+              <a:spcBef>
+                <a:spcPts val="0"/>
+              </a:spcBef>
+              <a:spcAft>
+                <a:spcPts val="0"/>
+              </a:spcAft>
+              <a:buClr>
+                <a:schemeClr val="dk1"/>
+              </a:buClr>
+              <a:buSzPts val="1100"/>
+              <a:buFont typeface="Arial"/>
+              <a:buNone/>
+            </a:pPr>
+            <a:r>
+              <a:rPr lang="en">
+                <a:solidFill>
+                  <a:schemeClr val="dk1"/>
+                </a:solidFill>
+              </a:rPr>
+              <a:t>5. Edge will pull docker images from MECM repo during instantiation, Edge docker should be logged in to MECM repo  prior to app instantiation, this is done as part of edgegallery deployment using deployment scripts ?</a:t>
+            </a:r>
+            <a:endParaRPr>
+              <a:solidFill>
+                <a:schemeClr val="dk1"/>
+              </a:solidFill>
+            </a:endParaRPr>
+          </a:p>
+        </p:txBody>
+      </p:sp>
+    </p:spTree>
+  </p:cSld>
+  <p:clrMapOvr>
+    <a:masterClrMapping/>
+  </p:clrMapOvr>
+</p:sld>
+</file>
+
+<file path=ppt/slides/slide11.xml><?xml version="1.0" encoding="utf-8"?>
+<p:sld xmlns:a="http://schemas.openxmlformats.org/drawingml/2006/main" xmlns:r="http://schemas.openxmlformats.org/officeDocument/2006/relationships" xmlns:mc="http://schemas.openxmlformats.org/markup-compatibility/2006" xmlns:mv="urn:schemas-microsoft-com:mac:vml" xmlns:p="http://schemas.openxmlformats.org/presentationml/2006/main" xmlns:c="http://schemas.openxmlformats.org/drawingml/2006/chart" xmlns:dgm="http://schemas.openxmlformats.org/drawingml/2006/diagram" xmlns:o="urn:schemas-microsoft-com:office:office" xmlns:v="urn:schemas-microsoft-com:vml" xmlns:pvml="urn:schemas-microsoft-com:office:powerpoint" xmlns:com="http://schemas.openxmlformats.org/drawingml/2006/compatibility" xmlns:p14="http://schemas.microsoft.com/office/powerpoint/2010/main" xmlns:p15="http://schemas.microsoft.com/office/powerpoint/2012/main" xmlns:ahyp="http://schemas.microsoft.com/office/drawing/2018/hyperlinkcolor">
+  <p:cSld>
+    <p:spTree>
+      <p:nvGrpSpPr>
+        <p:cNvPr id="135" name="Shape 135"/>
+        <p:cNvGrpSpPr/>
+        <p:nvPr/>
+      </p:nvGrpSpPr>
+      <p:grpSpPr>
+        <a:xfrm>
+          <a:off x="0" y="0"/>
+          <a:ext cx="0" cy="0"/>
+          <a:chOff x="0" y="0"/>
+          <a:chExt cx="0" cy="0"/>
+        </a:xfrm>
+      </p:grpSpPr>
+      <p:sp>
+        <p:nvSpPr>
+          <p:cNvPr id="136" name="Google Shape;136;p23"/>
           <p:cNvSpPr txBox="1"/>
           <p:nvPr>
             <p:ph type="ctrTitle"/>
@@ -6589,7 +7167,7 @@
             </a:pPr>
             <a:r>
               <a:rPr lang="en"/>
-              <a:t>BackUp Slides</a:t>
+              <a:t>Thank you</a:t>
             </a:r>
             <a:endParaRPr/>
           </a:p>
@@ -6603,12 +7181,12 @@
 </p:sld>
 </file>
 
-<file path=ppt/slides/slide11.xml><?xml version="1.0" encoding="utf-8"?>
+<file path=ppt/slides/slide12.xml><?xml version="1.0" encoding="utf-8"?>
 <p:sld xmlns:a="http://schemas.openxmlformats.org/drawingml/2006/main" xmlns:r="http://schemas.openxmlformats.org/officeDocument/2006/relationships" xmlns:mc="http://schemas.openxmlformats.org/markup-compatibility/2006" xmlns:mv="urn:schemas-microsoft-com:mac:vml" xmlns:p="http://schemas.openxmlformats.org/presentationml/2006/main" xmlns:c="http://schemas.openxmlformats.org/drawingml/2006/chart" xmlns:dgm="http://schemas.openxmlformats.org/drawingml/2006/diagram" xmlns:o="urn:schemas-microsoft-com:office:office" xmlns:v="urn:schemas-microsoft-com:vml" xmlns:pvml="urn:schemas-microsoft-com:office:powerpoint" xmlns:com="http://schemas.openxmlformats.org/drawingml/2006/compatibility" xmlns:p14="http://schemas.microsoft.com/office/powerpoint/2010/main" xmlns:p15="http://schemas.microsoft.com/office/powerpoint/2012/main" xmlns:ahyp="http://schemas.microsoft.com/office/drawing/2018/hyperlinkcolor">
   <p:cSld>
     <p:spTree>
       <p:nvGrpSpPr>
-        <p:cNvPr id="131" name="Shape 131"/>
+        <p:cNvPr id="140" name="Shape 140"/>
         <p:cNvGrpSpPr/>
         <p:nvPr/>
       </p:nvGrpSpPr>
@@ -6622,7 +7200,72 @@
       </p:grpSpPr>
       <p:sp>
         <p:nvSpPr>
-          <p:cNvPr id="132" name="Google Shape;132;p23"/>
+          <p:cNvPr id="141" name="Google Shape;141;p24"/>
+          <p:cNvSpPr txBox="1"/>
+          <p:nvPr>
+            <p:ph type="ctrTitle"/>
+          </p:nvPr>
+        </p:nvSpPr>
+        <p:spPr>
+          <a:xfrm>
+            <a:off x="311708" y="744575"/>
+            <a:ext cx="8520600" cy="2052600"/>
+          </a:xfrm>
+          <a:prstGeom prst="rect">
+            <a:avLst/>
+          </a:prstGeom>
+        </p:spPr>
+        <p:txBody>
+          <a:bodyPr anchorCtr="0" anchor="b" bIns="91425" lIns="91425" spcFirstLastPara="1" rIns="91425" wrap="square" tIns="91425">
+            <a:normAutofit/>
+          </a:bodyPr>
+          <a:lstStyle/>
+          <a:p>
+            <a:pPr indent="0" lvl="0" marL="0" rtl="0" algn="ctr">
+              <a:spcBef>
+                <a:spcPts val="0"/>
+              </a:spcBef>
+              <a:spcAft>
+                <a:spcPts val="0"/>
+              </a:spcAft>
+              <a:buNone/>
+            </a:pPr>
+            <a:r>
+              <a:rPr lang="en"/>
+              <a:t>BackUp Slides</a:t>
+            </a:r>
+            <a:endParaRPr/>
+          </a:p>
+        </p:txBody>
+      </p:sp>
+    </p:spTree>
+  </p:cSld>
+  <p:clrMapOvr>
+    <a:masterClrMapping/>
+  </p:clrMapOvr>
+</p:sld>
+</file>
+
+<file path=ppt/slides/slide13.xml><?xml version="1.0" encoding="utf-8"?>
+<p:sld xmlns:a="http://schemas.openxmlformats.org/drawingml/2006/main" xmlns:r="http://schemas.openxmlformats.org/officeDocument/2006/relationships" xmlns:mc="http://schemas.openxmlformats.org/markup-compatibility/2006" xmlns:mv="urn:schemas-microsoft-com:mac:vml" xmlns:p="http://schemas.openxmlformats.org/presentationml/2006/main" xmlns:c="http://schemas.openxmlformats.org/drawingml/2006/chart" xmlns:dgm="http://schemas.openxmlformats.org/drawingml/2006/diagram" xmlns:o="urn:schemas-microsoft-com:office:office" xmlns:v="urn:schemas-microsoft-com:vml" xmlns:pvml="urn:schemas-microsoft-com:office:powerpoint" xmlns:com="http://schemas.openxmlformats.org/drawingml/2006/compatibility" xmlns:p14="http://schemas.microsoft.com/office/powerpoint/2010/main" xmlns:p15="http://schemas.microsoft.com/office/powerpoint/2012/main" xmlns:ahyp="http://schemas.microsoft.com/office/drawing/2018/hyperlinkcolor">
+  <p:cSld>
+    <p:spTree>
+      <p:nvGrpSpPr>
+        <p:cNvPr id="145" name="Shape 145"/>
+        <p:cNvGrpSpPr/>
+        <p:nvPr/>
+      </p:nvGrpSpPr>
+      <p:grpSpPr>
+        <a:xfrm>
+          <a:off x="0" y="0"/>
+          <a:ext cx="0" cy="0"/>
+          <a:chOff x="0" y="0"/>
+          <a:chExt cx="0" cy="0"/>
+        </a:xfrm>
+      </p:grpSpPr>
+      <p:sp>
+        <p:nvSpPr>
+          <p:cNvPr id="146" name="Google Shape;146;p25"/>
           <p:cNvSpPr txBox="1"/>
           <p:nvPr/>
         </p:nvSpPr>
@@ -6700,7 +7343,7 @@
       </p:sp>
       <p:pic>
         <p:nvPicPr>
-          <p:cNvPr id="133" name="Google Shape;133;p23"/>
+          <p:cNvPr id="147" name="Google Shape;147;p25"/>
           <p:cNvPicPr preferRelativeResize="0"/>
           <p:nvPr/>
         </p:nvPicPr>
@@ -6728,7 +7371,7 @@
       </p:pic>
       <p:sp>
         <p:nvSpPr>
-          <p:cNvPr id="134" name="Google Shape;134;p23"/>
+          <p:cNvPr id="148" name="Google Shape;148;p25"/>
           <p:cNvSpPr txBox="1"/>
           <p:nvPr/>
         </p:nvSpPr>
@@ -6874,8 +7517,8 @@
         </p:nvSpPr>
         <p:spPr>
           <a:xfrm>
-            <a:off x="105000" y="-79227"/>
-            <a:ext cx="7443300" cy="400200"/>
+            <a:off x="49038" y="187800"/>
+            <a:ext cx="5727600" cy="400200"/>
           </a:xfrm>
           <a:prstGeom prst="rect">
             <a:avLst/>
@@ -6902,7 +7545,7 @@
             </a:pPr>
             <a:r>
               <a:rPr b="1" lang="en"/>
-              <a:t>Flow Diagram</a:t>
+              <a:t>Query APP store packages info</a:t>
             </a:r>
             <a:endParaRPr b="1"/>
           </a:p>
@@ -7391,8 +8034,8 @@
         </p:blipFill>
         <p:spPr>
           <a:xfrm>
-            <a:off x="165925" y="252748"/>
-            <a:ext cx="5445838" cy="4890750"/>
+            <a:off x="0" y="931750"/>
+            <a:ext cx="5825675" cy="3396487"/>
           </a:xfrm>
           <a:prstGeom prst="rect">
             <a:avLst/>
@@ -7436,6 +8079,330 @@
         </p:nvSpPr>
         <p:spPr>
           <a:xfrm>
+            <a:off x="105000" y="150550"/>
+            <a:ext cx="5727600" cy="400200"/>
+          </a:xfrm>
+          <a:prstGeom prst="rect">
+            <a:avLst/>
+          </a:prstGeom>
+          <a:noFill/>
+          <a:ln>
+            <a:noFill/>
+          </a:ln>
+        </p:spPr>
+        <p:txBody>
+          <a:bodyPr anchorCtr="0" anchor="t" bIns="91425" lIns="91425" spcFirstLastPara="1" rIns="91425" wrap="square" tIns="91425">
+            <a:spAutoFit/>
+          </a:bodyPr>
+          <a:lstStyle/>
+          <a:p>
+            <a:pPr indent="0" lvl="0" marL="0" rtl="0" algn="l">
+              <a:spcBef>
+                <a:spcPts val="0"/>
+              </a:spcBef>
+              <a:spcAft>
+                <a:spcPts val="0"/>
+              </a:spcAft>
+              <a:buNone/>
+            </a:pPr>
+            <a:r>
+              <a:rPr b="1" lang="en"/>
+              <a:t>Sync docker images for the selected application packages</a:t>
+            </a:r>
+            <a:endParaRPr b="1"/>
+          </a:p>
+        </p:txBody>
+      </p:sp>
+      <p:sp>
+        <p:nvSpPr>
+          <p:cNvPr id="75" name="Google Shape;75;p15"/>
+          <p:cNvSpPr txBox="1"/>
+          <p:nvPr/>
+        </p:nvSpPr>
+        <p:spPr>
+          <a:xfrm>
+            <a:off x="5832597" y="911250"/>
+            <a:ext cx="2311800" cy="400200"/>
+          </a:xfrm>
+          <a:prstGeom prst="rect">
+            <a:avLst/>
+          </a:prstGeom>
+          <a:noFill/>
+          <a:ln>
+            <a:noFill/>
+          </a:ln>
+        </p:spPr>
+        <p:txBody>
+          <a:bodyPr anchorCtr="0" anchor="t" bIns="91425" lIns="91425" spcFirstLastPara="1" rIns="91425" wrap="square" tIns="91425">
+            <a:spAutoFit/>
+          </a:bodyPr>
+          <a:lstStyle/>
+          <a:p>
+            <a:pPr indent="0" lvl="0" marL="0" rtl="0" algn="l">
+              <a:spcBef>
+                <a:spcPts val="0"/>
+              </a:spcBef>
+              <a:spcAft>
+                <a:spcPts val="0"/>
+              </a:spcAft>
+              <a:buNone/>
+            </a:pPr>
+            <a:r>
+              <a:rPr b="1" lang="en"/>
+              <a:t>APP store url</a:t>
+            </a:r>
+            <a:endParaRPr b="1"/>
+          </a:p>
+        </p:txBody>
+      </p:sp>
+      <p:sp>
+        <p:nvSpPr>
+          <p:cNvPr id="76" name="Google Shape;76;p15"/>
+          <p:cNvSpPr txBox="1"/>
+          <p:nvPr/>
+        </p:nvSpPr>
+        <p:spPr>
+          <a:xfrm>
+            <a:off x="5632900" y="1151230"/>
+            <a:ext cx="3420600" cy="1376100"/>
+          </a:xfrm>
+          <a:prstGeom prst="rect">
+            <a:avLst/>
+          </a:prstGeom>
+          <a:noFill/>
+          <a:ln>
+            <a:noFill/>
+          </a:ln>
+        </p:spPr>
+        <p:txBody>
+          <a:bodyPr anchorCtr="0" anchor="t" bIns="91425" lIns="91425" spcFirstLastPara="1" rIns="91425" wrap="square" tIns="91425">
+            <a:spAutoFit/>
+          </a:bodyPr>
+          <a:lstStyle/>
+          <a:p>
+            <a:pPr indent="0" lvl="0" marL="0" rtl="0" algn="l">
+              <a:spcBef>
+                <a:spcPts val="0"/>
+              </a:spcBef>
+              <a:spcAft>
+                <a:spcPts val="0"/>
+              </a:spcAft>
+              <a:buNone/>
+            </a:pPr>
+            <a:r>
+              <a:t/>
+            </a:r>
+            <a:endParaRPr sz="900">
+              <a:solidFill>
+                <a:srgbClr val="505050"/>
+              </a:solidFill>
+              <a:highlight>
+                <a:srgbClr val="FFFFFF"/>
+              </a:highlight>
+            </a:endParaRPr>
+          </a:p>
+          <a:p>
+            <a:pPr indent="0" lvl="0" marL="0" rtl="0" algn="l">
+              <a:spcBef>
+                <a:spcPts val="0"/>
+              </a:spcBef>
+              <a:spcAft>
+                <a:spcPts val="0"/>
+              </a:spcAft>
+              <a:buNone/>
+            </a:pPr>
+            <a:r>
+              <a:t/>
+            </a:r>
+            <a:endParaRPr sz="900">
+              <a:solidFill>
+                <a:srgbClr val="505050"/>
+              </a:solidFill>
+              <a:highlight>
+                <a:srgbClr val="FFFFFF"/>
+              </a:highlight>
+            </a:endParaRPr>
+          </a:p>
+          <a:p>
+            <a:pPr indent="0" lvl="0" marL="114300" marR="114300" rtl="0" algn="l">
+              <a:lnSpc>
+                <a:spcPct val="140000"/>
+              </a:lnSpc>
+              <a:spcBef>
+                <a:spcPts val="0"/>
+              </a:spcBef>
+              <a:spcAft>
+                <a:spcPts val="0"/>
+              </a:spcAft>
+              <a:buNone/>
+            </a:pPr>
+            <a:r>
+              <a:rPr lang="en" sz="900">
+                <a:solidFill>
+                  <a:srgbClr val="505050"/>
+                </a:solidFill>
+                <a:highlight>
+                  <a:srgbClr val="FFFFFF"/>
+                </a:highlight>
+              </a:rPr>
+              <a:t>GET: </a:t>
+            </a:r>
+            <a:r>
+              <a:rPr lang="en" sz="900" u="sng">
+                <a:solidFill>
+                  <a:schemeClr val="accent5"/>
+                </a:solidFill>
+                <a:highlight>
+                  <a:srgbClr val="FFFFFF"/>
+                </a:highlight>
+                <a:hlinkClick r:id="rId3">
+                  <a:extLst>
+                    <a:ext uri="{A12FA001-AC4F-418D-AE19-62706E023703}">
+                      <ahyp:hlinkClr val="tx"/>
+                    </a:ext>
+                  </a:extLst>
+                </a:hlinkClick>
+              </a:rPr>
+              <a:t>https://119.8.63.144:30099/</a:t>
+            </a:r>
+            <a:r>
+              <a:rPr lang="en" sz="900">
+                <a:solidFill>
+                  <a:srgbClr val="404040"/>
+                </a:solidFill>
+                <a:latin typeface="Courier New"/>
+                <a:ea typeface="Courier New"/>
+                <a:cs typeface="Courier New"/>
+                <a:sym typeface="Courier New"/>
+              </a:rPr>
+              <a:t>mec/appstore/v1/apps/{appId}/packages/{packageId}/action/download</a:t>
+            </a:r>
+            <a:endParaRPr sz="900">
+              <a:solidFill>
+                <a:srgbClr val="404040"/>
+              </a:solidFill>
+              <a:latin typeface="Courier New"/>
+              <a:ea typeface="Courier New"/>
+              <a:cs typeface="Courier New"/>
+              <a:sym typeface="Courier New"/>
+            </a:endParaRPr>
+          </a:p>
+          <a:p>
+            <a:pPr indent="0" lvl="0" marL="114300" marR="114300" rtl="0" algn="l">
+              <a:lnSpc>
+                <a:spcPct val="140000"/>
+              </a:lnSpc>
+              <a:spcBef>
+                <a:spcPts val="0"/>
+              </a:spcBef>
+              <a:spcAft>
+                <a:spcPts val="0"/>
+              </a:spcAft>
+              <a:buClr>
+                <a:schemeClr val="dk1"/>
+              </a:buClr>
+              <a:buSzPts val="1100"/>
+              <a:buFont typeface="Arial"/>
+              <a:buNone/>
+            </a:pPr>
+            <a:r>
+              <a:t/>
+            </a:r>
+            <a:endParaRPr sz="900">
+              <a:solidFill>
+                <a:srgbClr val="404040"/>
+              </a:solidFill>
+              <a:latin typeface="Courier New"/>
+              <a:ea typeface="Courier New"/>
+              <a:cs typeface="Courier New"/>
+              <a:sym typeface="Courier New"/>
+            </a:endParaRPr>
+          </a:p>
+          <a:p>
+            <a:pPr indent="0" lvl="0" marL="0" rtl="0" algn="l">
+              <a:spcBef>
+                <a:spcPts val="0"/>
+              </a:spcBef>
+              <a:spcAft>
+                <a:spcPts val="0"/>
+              </a:spcAft>
+              <a:buNone/>
+            </a:pPr>
+            <a:r>
+              <a:t/>
+            </a:r>
+            <a:endParaRPr sz="900">
+              <a:solidFill>
+                <a:srgbClr val="505050"/>
+              </a:solidFill>
+              <a:highlight>
+                <a:srgbClr val="FFFFFF"/>
+              </a:highlight>
+            </a:endParaRPr>
+          </a:p>
+        </p:txBody>
+      </p:sp>
+      <p:pic>
+        <p:nvPicPr>
+          <p:cNvPr id="77" name="Google Shape;77;p15"/>
+          <p:cNvPicPr preferRelativeResize="0"/>
+          <p:nvPr/>
+        </p:nvPicPr>
+        <p:blipFill>
+          <a:blip r:embed="rId4">
+            <a:alphaModFix/>
+          </a:blip>
+          <a:stretch>
+            <a:fillRect/>
+          </a:stretch>
+        </p:blipFill>
+        <p:spPr>
+          <a:xfrm>
+            <a:off x="76200" y="703150"/>
+            <a:ext cx="5680199" cy="2712623"/>
+          </a:xfrm>
+          <a:prstGeom prst="rect">
+            <a:avLst/>
+          </a:prstGeom>
+          <a:noFill/>
+          <a:ln>
+            <a:noFill/>
+          </a:ln>
+        </p:spPr>
+      </p:pic>
+    </p:spTree>
+  </p:cSld>
+  <p:clrMapOvr>
+    <a:masterClrMapping/>
+  </p:clrMapOvr>
+</p:sld>
+</file>
+
+<file path=ppt/slides/slide4.xml><?xml version="1.0" encoding="utf-8"?>
+<p:sld xmlns:a="http://schemas.openxmlformats.org/drawingml/2006/main" xmlns:r="http://schemas.openxmlformats.org/officeDocument/2006/relationships" xmlns:mc="http://schemas.openxmlformats.org/markup-compatibility/2006" xmlns:mv="urn:schemas-microsoft-com:mac:vml" xmlns:p="http://schemas.openxmlformats.org/presentationml/2006/main" xmlns:c="http://schemas.openxmlformats.org/drawingml/2006/chart" xmlns:dgm="http://schemas.openxmlformats.org/drawingml/2006/diagram" xmlns:o="urn:schemas-microsoft-com:office:office" xmlns:v="urn:schemas-microsoft-com:vml" xmlns:pvml="urn:schemas-microsoft-com:office:powerpoint" xmlns:com="http://schemas.openxmlformats.org/drawingml/2006/compatibility" xmlns:p14="http://schemas.microsoft.com/office/powerpoint/2010/main" xmlns:p15="http://schemas.microsoft.com/office/powerpoint/2012/main" xmlns:ahyp="http://schemas.microsoft.com/office/drawing/2018/hyperlinkcolor">
+  <p:cSld>
+    <p:spTree>
+      <p:nvGrpSpPr>
+        <p:cNvPr id="81" name="Shape 81"/>
+        <p:cNvGrpSpPr/>
+        <p:nvPr/>
+      </p:nvGrpSpPr>
+      <p:grpSpPr>
+        <a:xfrm>
+          <a:off x="0" y="0"/>
+          <a:ext cx="0" cy="0"/>
+          <a:chOff x="0" y="0"/>
+          <a:chExt cx="0" cy="0"/>
+        </a:xfrm>
+      </p:grpSpPr>
+      <p:sp>
+        <p:nvSpPr>
+          <p:cNvPr id="82" name="Google Shape;82;p16"/>
+          <p:cNvSpPr txBox="1"/>
+          <p:nvPr/>
+        </p:nvSpPr>
+        <p:spPr>
+          <a:xfrm>
             <a:off x="0" y="0"/>
             <a:ext cx="3000000" cy="400200"/>
           </a:xfrm>
@@ -7468,7 +8435,7 @@
                   <a:schemeClr val="dk1"/>
                 </a:solidFill>
               </a:rPr>
-              <a:t>Flow Diagram</a:t>
+              <a:t>Distribute flow diagram</a:t>
             </a:r>
             <a:endParaRPr b="1">
               <a:solidFill>
@@ -7480,7 +8447,7 @@
       </p:sp>
       <p:sp>
         <p:nvSpPr>
-          <p:cNvPr id="75" name="Google Shape;75;p15"/>
+          <p:cNvPr id="83" name="Google Shape;83;p16"/>
           <p:cNvSpPr txBox="1"/>
           <p:nvPr/>
         </p:nvSpPr>
@@ -7530,7 +8497,7 @@
       </p:sp>
       <p:pic>
         <p:nvPicPr>
-          <p:cNvPr id="76" name="Google Shape;76;p15"/>
+          <p:cNvPr id="84" name="Google Shape;84;p16"/>
           <p:cNvPicPr preferRelativeResize="0"/>
           <p:nvPr/>
         </p:nvPicPr>
@@ -7558,7 +8525,7 @@
       </p:pic>
       <p:pic>
         <p:nvPicPr>
-          <p:cNvPr id="77" name="Google Shape;77;p15"/>
+          <p:cNvPr id="85" name="Google Shape;85;p16"/>
           <p:cNvPicPr preferRelativeResize="0"/>
           <p:nvPr/>
         </p:nvPicPr>
@@ -7586,7 +8553,7 @@
       </p:pic>
       <p:sp>
         <p:nvSpPr>
-          <p:cNvPr id="78" name="Google Shape;78;p15"/>
+          <p:cNvPr id="86" name="Google Shape;86;p16"/>
           <p:cNvSpPr txBox="1"/>
           <p:nvPr/>
         </p:nvSpPr>
@@ -7628,14 +8595,14 @@
       </p:sp>
       <p:sp>
         <p:nvSpPr>
-          <p:cNvPr id="79" name="Google Shape;79;p15"/>
+          <p:cNvPr id="87" name="Google Shape;87;p16"/>
           <p:cNvSpPr txBox="1"/>
           <p:nvPr/>
         </p:nvSpPr>
         <p:spPr>
           <a:xfrm>
-            <a:off x="5260500" y="1280875"/>
-            <a:ext cx="3608700" cy="1385400"/>
+            <a:off x="5663625" y="747475"/>
+            <a:ext cx="3586800" cy="2493600"/>
           </a:xfrm>
           <a:prstGeom prst="rect">
             <a:avLst/>
@@ -7693,11 +8660,73 @@
             </a:pPr>
             <a:r>
               <a:rPr lang="en" sz="1000"/>
-              <a:t>In Edge, docker login to MECM repo is must prior to app instantiation</a:t>
+              <a:t>In Edge, docker login to MECM repo is must, prior to app instantiation</a:t>
             </a:r>
             <a:r>
               <a:rPr lang="en" sz="1200"/>
               <a:t>, this should be handled as part of edgegallery deployment ?</a:t>
+            </a:r>
+            <a:endParaRPr sz="1200"/>
+          </a:p>
+          <a:p>
+            <a:pPr indent="0" lvl="0" marL="0" rtl="0" algn="l">
+              <a:spcBef>
+                <a:spcPts val="0"/>
+              </a:spcBef>
+              <a:spcAft>
+                <a:spcPts val="0"/>
+              </a:spcAft>
+              <a:buNone/>
+            </a:pPr>
+            <a:r>
+              <a:t/>
+            </a:r>
+            <a:endParaRPr sz="1200"/>
+          </a:p>
+          <a:p>
+            <a:pPr indent="0" lvl="0" marL="0" rtl="0" algn="l">
+              <a:spcBef>
+                <a:spcPts val="0"/>
+              </a:spcBef>
+              <a:spcAft>
+                <a:spcPts val="0"/>
+              </a:spcAft>
+              <a:buNone/>
+            </a:pPr>
+            <a:r>
+              <a:rPr lang="en" sz="1200"/>
+              <a:t>Update image path in the package with mecm.repo.com/imageName ?</a:t>
+            </a:r>
+            <a:endParaRPr sz="1200"/>
+          </a:p>
+          <a:p>
+            <a:pPr indent="0" lvl="0" marL="0" rtl="0" algn="l">
+              <a:spcBef>
+                <a:spcPts val="0"/>
+              </a:spcBef>
+              <a:spcAft>
+                <a:spcPts val="0"/>
+              </a:spcAft>
+              <a:buNone/>
+            </a:pPr>
+            <a:r>
+              <a:t/>
+            </a:r>
+            <a:endParaRPr sz="1200"/>
+          </a:p>
+          <a:p>
+            <a:pPr indent="0" lvl="0" marL="0" rtl="0" algn="l">
+              <a:spcBef>
+                <a:spcPts val="0"/>
+              </a:spcBef>
+              <a:spcAft>
+                <a:spcPts val="0"/>
+              </a:spcAft>
+              <a:buNone/>
+            </a:pPr>
+            <a:r>
+              <a:rPr lang="en" sz="1200"/>
+              <a:t>mecm.repo.com should be added to etc/hosts in edge</a:t>
             </a:r>
             <a:endParaRPr sz="1200"/>
           </a:p>
@@ -7726,12 +8755,107 @@
 </p:sld>
 </file>
 
-<file path=ppt/slides/slide4.xml><?xml version="1.0" encoding="utf-8"?>
+<file path=ppt/slides/slide5.xml><?xml version="1.0" encoding="utf-8"?>
 <p:sld xmlns:a="http://schemas.openxmlformats.org/drawingml/2006/main" xmlns:r="http://schemas.openxmlformats.org/officeDocument/2006/relationships" xmlns:mc="http://schemas.openxmlformats.org/markup-compatibility/2006" xmlns:mv="urn:schemas-microsoft-com:mac:vml" xmlns:p="http://schemas.openxmlformats.org/presentationml/2006/main" xmlns:c="http://schemas.openxmlformats.org/drawingml/2006/chart" xmlns:dgm="http://schemas.openxmlformats.org/drawingml/2006/diagram" xmlns:o="urn:schemas-microsoft-com:office:office" xmlns:v="urn:schemas-microsoft-com:vml" xmlns:pvml="urn:schemas-microsoft-com:office:powerpoint" xmlns:com="http://schemas.openxmlformats.org/drawingml/2006/compatibility" xmlns:p14="http://schemas.microsoft.com/office/powerpoint/2010/main" xmlns:p15="http://schemas.microsoft.com/office/powerpoint/2012/main" xmlns:ahyp="http://schemas.microsoft.com/office/drawing/2018/hyperlinkcolor">
   <p:cSld>
     <p:spTree>
       <p:nvGrpSpPr>
-        <p:cNvPr id="83" name="Shape 83"/>
+        <p:cNvPr id="91" name="Shape 91"/>
+        <p:cNvGrpSpPr/>
+        <p:nvPr/>
+      </p:nvGrpSpPr>
+      <p:grpSpPr>
+        <a:xfrm>
+          <a:off x="0" y="0"/>
+          <a:ext cx="0" cy="0"/>
+          <a:chOff x="0" y="0"/>
+          <a:chExt cx="0" cy="0"/>
+        </a:xfrm>
+      </p:grpSpPr>
+      <p:sp>
+        <p:nvSpPr>
+          <p:cNvPr id="92" name="Google Shape;92;p17"/>
+          <p:cNvSpPr txBox="1"/>
+          <p:nvPr/>
+        </p:nvSpPr>
+        <p:spPr>
+          <a:xfrm>
+            <a:off x="105000" y="225573"/>
+            <a:ext cx="7443300" cy="400200"/>
+          </a:xfrm>
+          <a:prstGeom prst="rect">
+            <a:avLst/>
+          </a:prstGeom>
+          <a:noFill/>
+          <a:ln>
+            <a:noFill/>
+          </a:ln>
+        </p:spPr>
+        <p:txBody>
+          <a:bodyPr anchorCtr="0" anchor="t" bIns="91425" lIns="91425" spcFirstLastPara="1" rIns="91425" wrap="square" tIns="91425">
+            <a:spAutoFit/>
+          </a:bodyPr>
+          <a:lstStyle/>
+          <a:p>
+            <a:pPr indent="0" lvl="0" marL="0" rtl="0" algn="l">
+              <a:spcBef>
+                <a:spcPts val="0"/>
+              </a:spcBef>
+              <a:spcAft>
+                <a:spcPts val="0"/>
+              </a:spcAft>
+              <a:buNone/>
+            </a:pPr>
+            <a:r>
+              <a:rPr b="1" lang="en"/>
+              <a:t>ATP Distribute/upload package to APM</a:t>
+            </a:r>
+            <a:endParaRPr b="1"/>
+          </a:p>
+        </p:txBody>
+      </p:sp>
+      <p:pic>
+        <p:nvPicPr>
+          <p:cNvPr id="93" name="Google Shape;93;p17"/>
+          <p:cNvPicPr preferRelativeResize="0"/>
+          <p:nvPr/>
+        </p:nvPicPr>
+        <p:blipFill>
+          <a:blip r:embed="rId3">
+            <a:alphaModFix/>
+          </a:blip>
+          <a:stretch>
+            <a:fillRect/>
+          </a:stretch>
+        </p:blipFill>
+        <p:spPr>
+          <a:xfrm>
+            <a:off x="291100" y="1009348"/>
+            <a:ext cx="5419725" cy="2676525"/>
+          </a:xfrm>
+          <a:prstGeom prst="rect">
+            <a:avLst/>
+          </a:prstGeom>
+          <a:noFill/>
+          <a:ln>
+            <a:noFill/>
+          </a:ln>
+        </p:spPr>
+      </p:pic>
+    </p:spTree>
+  </p:cSld>
+  <p:clrMapOvr>
+    <a:masterClrMapping/>
+  </p:clrMapOvr>
+</p:sld>
+</file>
+
+<file path=ppt/slides/slide6.xml><?xml version="1.0" encoding="utf-8"?>
+<p:sld xmlns:a="http://schemas.openxmlformats.org/drawingml/2006/main" xmlns:r="http://schemas.openxmlformats.org/officeDocument/2006/relationships" xmlns:mc="http://schemas.openxmlformats.org/markup-compatibility/2006" xmlns:mv="urn:schemas-microsoft-com:mac:vml" xmlns:p="http://schemas.openxmlformats.org/presentationml/2006/main" xmlns:c="http://schemas.openxmlformats.org/drawingml/2006/chart" xmlns:dgm="http://schemas.openxmlformats.org/drawingml/2006/diagram" xmlns:o="urn:schemas-microsoft-com:office:office" xmlns:v="urn:schemas-microsoft-com:vml" xmlns:pvml="urn:schemas-microsoft-com:office:powerpoint" xmlns:com="http://schemas.openxmlformats.org/drawingml/2006/compatibility" xmlns:p14="http://schemas.microsoft.com/office/powerpoint/2010/main" xmlns:p15="http://schemas.microsoft.com/office/powerpoint/2012/main" xmlns:ahyp="http://schemas.microsoft.com/office/drawing/2018/hyperlinkcolor">
+  <p:cSld>
+    <p:spTree>
+      <p:nvGrpSpPr>
+        <p:cNvPr id="97" name="Shape 97"/>
         <p:cNvGrpSpPr/>
         <p:nvPr/>
       </p:nvGrpSpPr>
@@ -7745,7 +8869,7 @@
       </p:grpSpPr>
       <p:graphicFrame>
         <p:nvGraphicFramePr>
-          <p:cNvPr id="84" name="Google Shape;84;p16"/>
+          <p:cNvPr id="98" name="Google Shape;98;p18"/>
           <p:cNvGraphicFramePr/>
           <p:nvPr/>
         </p:nvGraphicFramePr>
@@ -7758,7 +8882,7 @@
             <a:tbl>
               <a:tblPr>
                 <a:noFill/>
-                <a:tableStyleId>{98A1775E-1B0E-4E28-BF93-02A347C5E151}</a:tableStyleId>
+                <a:tableStyleId>{920E11B7-8246-417B-B93F-AAA60EBE0057}</a:tableStyleId>
               </a:tblPr>
               <a:tblGrid>
                 <a:gridCol w="1111225"/>
@@ -8944,12 +10068,12 @@
 </p:sld>
 </file>
 
-<file path=ppt/slides/slide5.xml><?xml version="1.0" encoding="utf-8"?>
+<file path=ppt/slides/slide7.xml><?xml version="1.0" encoding="utf-8"?>
 <p:sld xmlns:a="http://schemas.openxmlformats.org/drawingml/2006/main" xmlns:r="http://schemas.openxmlformats.org/officeDocument/2006/relationships" xmlns:mc="http://schemas.openxmlformats.org/markup-compatibility/2006" xmlns:mv="urn:schemas-microsoft-com:mac:vml" xmlns:p="http://schemas.openxmlformats.org/presentationml/2006/main" xmlns:c="http://schemas.openxmlformats.org/drawingml/2006/chart" xmlns:dgm="http://schemas.openxmlformats.org/drawingml/2006/diagram" xmlns:o="urn:schemas-microsoft-com:office:office" xmlns:v="urn:schemas-microsoft-com:vml" xmlns:pvml="urn:schemas-microsoft-com:office:powerpoint" xmlns:com="http://schemas.openxmlformats.org/drawingml/2006/compatibility" xmlns:p14="http://schemas.microsoft.com/office/powerpoint/2010/main" xmlns:p15="http://schemas.microsoft.com/office/powerpoint/2012/main" xmlns:ahyp="http://schemas.microsoft.com/office/drawing/2018/hyperlinkcolor">
   <p:cSld>
     <p:spTree>
       <p:nvGrpSpPr>
-        <p:cNvPr id="88" name="Shape 88"/>
+        <p:cNvPr id="102" name="Shape 102"/>
         <p:cNvGrpSpPr/>
         <p:nvPr/>
       </p:nvGrpSpPr>
@@ -8963,7 +10087,7 @@
       </p:grpSpPr>
       <p:sp>
         <p:nvSpPr>
-          <p:cNvPr id="89" name="Google Shape;89;p17"/>
+          <p:cNvPr id="103" name="Google Shape;103;p19"/>
           <p:cNvSpPr txBox="1"/>
           <p:nvPr/>
         </p:nvSpPr>
@@ -9116,7 +10240,7 @@
       </p:sp>
       <p:sp>
         <p:nvSpPr>
-          <p:cNvPr id="90" name="Google Shape;90;p17"/>
+          <p:cNvPr id="104" name="Google Shape;104;p19"/>
           <p:cNvSpPr txBox="1"/>
           <p:nvPr/>
         </p:nvSpPr>
@@ -9157,7 +10281,7 @@
       </p:sp>
       <p:sp>
         <p:nvSpPr>
-          <p:cNvPr id="91" name="Google Shape;91;p17"/>
+          <p:cNvPr id="105" name="Google Shape;105;p19"/>
           <p:cNvSpPr txBox="1"/>
           <p:nvPr/>
         </p:nvSpPr>
@@ -9270,7 +10394,7 @@
       </p:sp>
       <p:sp>
         <p:nvSpPr>
-          <p:cNvPr id="92" name="Google Shape;92;p17"/>
+          <p:cNvPr id="106" name="Google Shape;106;p19"/>
           <p:cNvSpPr txBox="1"/>
           <p:nvPr/>
         </p:nvSpPr>
@@ -9311,7 +10435,7 @@
       </p:sp>
       <p:sp>
         <p:nvSpPr>
-          <p:cNvPr id="93" name="Google Shape;93;p17"/>
+          <p:cNvPr id="107" name="Google Shape;107;p19"/>
           <p:cNvSpPr txBox="1"/>
           <p:nvPr/>
         </p:nvSpPr>
@@ -9780,7 +10904,7 @@
       </p:sp>
       <p:sp>
         <p:nvSpPr>
-          <p:cNvPr id="94" name="Google Shape;94;p17"/>
+          <p:cNvPr id="108" name="Google Shape;108;p19"/>
           <p:cNvSpPr txBox="1"/>
           <p:nvPr/>
         </p:nvSpPr>
@@ -9821,7 +10945,7 @@
       </p:sp>
       <p:sp>
         <p:nvSpPr>
-          <p:cNvPr id="95" name="Google Shape;95;p17"/>
+          <p:cNvPr id="109" name="Google Shape;109;p19"/>
           <p:cNvSpPr txBox="1"/>
           <p:nvPr/>
         </p:nvSpPr>
@@ -9962,7 +11086,7 @@
       </p:sp>
       <p:sp>
         <p:nvSpPr>
-          <p:cNvPr id="96" name="Google Shape;96;p17"/>
+          <p:cNvPr id="110" name="Google Shape;110;p19"/>
           <p:cNvSpPr txBox="1"/>
           <p:nvPr/>
         </p:nvSpPr>
@@ -10121,12 +11245,12 @@
 </p:sld>
 </file>
 
-<file path=ppt/slides/slide6.xml><?xml version="1.0" encoding="utf-8"?>
+<file path=ppt/slides/slide8.xml><?xml version="1.0" encoding="utf-8"?>
 <p:sld xmlns:a="http://schemas.openxmlformats.org/drawingml/2006/main" xmlns:r="http://schemas.openxmlformats.org/officeDocument/2006/relationships" xmlns:mc="http://schemas.openxmlformats.org/markup-compatibility/2006" xmlns:mv="urn:schemas-microsoft-com:mac:vml" xmlns:p="http://schemas.openxmlformats.org/presentationml/2006/main" xmlns:c="http://schemas.openxmlformats.org/drawingml/2006/chart" xmlns:dgm="http://schemas.openxmlformats.org/drawingml/2006/diagram" xmlns:o="urn:schemas-microsoft-com:office:office" xmlns:v="urn:schemas-microsoft-com:vml" xmlns:pvml="urn:schemas-microsoft-com:office:powerpoint" xmlns:com="http://schemas.openxmlformats.org/drawingml/2006/compatibility" xmlns:p14="http://schemas.microsoft.com/office/powerpoint/2010/main" xmlns:p15="http://schemas.microsoft.com/office/powerpoint/2012/main" xmlns:ahyp="http://schemas.microsoft.com/office/drawing/2018/hyperlinkcolor">
   <p:cSld>
     <p:spTree>
       <p:nvGrpSpPr>
-        <p:cNvPr id="100" name="Shape 100"/>
+        <p:cNvPr id="114" name="Shape 114"/>
         <p:cNvGrpSpPr/>
         <p:nvPr/>
       </p:nvGrpSpPr>
@@ -10140,7 +11264,7 @@
       </p:grpSpPr>
       <p:sp>
         <p:nvSpPr>
-          <p:cNvPr id="101" name="Google Shape;101;p18"/>
+          <p:cNvPr id="115" name="Google Shape;115;p20"/>
           <p:cNvSpPr txBox="1"/>
           <p:nvPr>
             <p:ph type="ctrTitle"/>
@@ -10186,12 +11310,12 @@
 </p:sld>
 </file>
 
-<file path=ppt/slides/slide7.xml><?xml version="1.0" encoding="utf-8"?>
+<file path=ppt/slides/slide9.xml><?xml version="1.0" encoding="utf-8"?>
 <p:sld xmlns:a="http://schemas.openxmlformats.org/drawingml/2006/main" xmlns:r="http://schemas.openxmlformats.org/officeDocument/2006/relationships" xmlns:mc="http://schemas.openxmlformats.org/markup-compatibility/2006" xmlns:mv="urn:schemas-microsoft-com:mac:vml" xmlns:p="http://schemas.openxmlformats.org/presentationml/2006/main" xmlns:c="http://schemas.openxmlformats.org/drawingml/2006/chart" xmlns:dgm="http://schemas.openxmlformats.org/drawingml/2006/diagram" xmlns:o="urn:schemas-microsoft-com:office:office" xmlns:v="urn:schemas-microsoft-com:vml" xmlns:pvml="urn:schemas-microsoft-com:office:powerpoint" xmlns:com="http://schemas.openxmlformats.org/drawingml/2006/compatibility" xmlns:p14="http://schemas.microsoft.com/office/powerpoint/2010/main" xmlns:p15="http://schemas.microsoft.com/office/powerpoint/2012/main" xmlns:ahyp="http://schemas.microsoft.com/office/drawing/2018/hyperlinkcolor">
   <p:cSld>
     <p:spTree>
       <p:nvGrpSpPr>
-        <p:cNvPr id="105" name="Shape 105"/>
+        <p:cNvPr id="119" name="Shape 119"/>
         <p:cNvGrpSpPr/>
         <p:nvPr/>
       </p:nvGrpSpPr>
@@ -10205,7 +11329,7 @@
       </p:grpSpPr>
       <p:pic>
         <p:nvPicPr>
-          <p:cNvPr id="106" name="Google Shape;106;p19"/>
+          <p:cNvPr id="120" name="Google Shape;120;p21"/>
           <p:cNvPicPr preferRelativeResize="0"/>
           <p:nvPr/>
         </p:nvPicPr>
@@ -10233,7 +11357,7 @@
       </p:pic>
       <p:pic>
         <p:nvPicPr>
-          <p:cNvPr id="107" name="Google Shape;107;p19"/>
+          <p:cNvPr id="121" name="Google Shape;121;p21"/>
           <p:cNvPicPr preferRelativeResize="0"/>
           <p:nvPr/>
         </p:nvPicPr>
@@ -10261,7 +11385,7 @@
       </p:pic>
       <p:pic>
         <p:nvPicPr>
-          <p:cNvPr id="108" name="Google Shape;108;p19"/>
+          <p:cNvPr id="122" name="Google Shape;122;p21"/>
           <p:cNvPicPr preferRelativeResize="0"/>
           <p:nvPr/>
         </p:nvPicPr>
@@ -10289,7 +11413,7 @@
       </p:pic>
       <p:pic>
         <p:nvPicPr>
-          <p:cNvPr id="109" name="Google Shape;109;p19"/>
+          <p:cNvPr id="123" name="Google Shape;123;p21"/>
           <p:cNvPicPr preferRelativeResize="0"/>
           <p:nvPr/>
         </p:nvPicPr>
@@ -10317,7 +11441,7 @@
       </p:pic>
       <p:sp>
         <p:nvSpPr>
-          <p:cNvPr id="110" name="Google Shape;110;p19"/>
+          <p:cNvPr id="124" name="Google Shape;124;p21"/>
           <p:cNvSpPr txBox="1"/>
           <p:nvPr/>
         </p:nvSpPr>
@@ -10367,7 +11491,7 @@
       </p:sp>
       <p:sp>
         <p:nvSpPr>
-          <p:cNvPr id="111" name="Google Shape;111;p19"/>
+          <p:cNvPr id="125" name="Google Shape;125;p21"/>
           <p:cNvSpPr/>
           <p:nvPr/>
         </p:nvSpPr>
@@ -10417,7 +11541,7 @@
       </p:sp>
       <p:sp>
         <p:nvSpPr>
-          <p:cNvPr id="112" name="Google Shape;112;p19"/>
+          <p:cNvPr id="126" name="Google Shape;126;p21"/>
           <p:cNvSpPr/>
           <p:nvPr/>
         </p:nvSpPr>
@@ -10473,450 +11597,286 @@
 </p:sld>
 </file>
 
-<file path=ppt/slides/slide8.xml><?xml version="1.0" encoding="utf-8"?>
-<p:sld xmlns:a="http://schemas.openxmlformats.org/drawingml/2006/main" xmlns:r="http://schemas.openxmlformats.org/officeDocument/2006/relationships" xmlns:mc="http://schemas.openxmlformats.org/markup-compatibility/2006" xmlns:mv="urn:schemas-microsoft-com:mac:vml" xmlns:p="http://schemas.openxmlformats.org/presentationml/2006/main" xmlns:c="http://schemas.openxmlformats.org/drawingml/2006/chart" xmlns:dgm="http://schemas.openxmlformats.org/drawingml/2006/diagram" xmlns:o="urn:schemas-microsoft-com:office:office" xmlns:v="urn:schemas-microsoft-com:vml" xmlns:pvml="urn:schemas-microsoft-com:office:powerpoint" xmlns:com="http://schemas.openxmlformats.org/drawingml/2006/compatibility" xmlns:p14="http://schemas.microsoft.com/office/powerpoint/2010/main" xmlns:p15="http://schemas.microsoft.com/office/powerpoint/2012/main" xmlns:ahyp="http://schemas.microsoft.com/office/drawing/2018/hyperlinkcolor">
-  <p:cSld>
-    <p:spTree>
-      <p:nvGrpSpPr>
-        <p:cNvPr id="116" name="Shape 116"/>
-        <p:cNvGrpSpPr/>
-        <p:nvPr/>
-      </p:nvGrpSpPr>
-      <p:grpSpPr>
-        <a:xfrm>
-          <a:off x="0" y="0"/>
-          <a:ext cx="0" cy="0"/>
-          <a:chOff x="0" y="0"/>
-          <a:chExt cx="0" cy="0"/>
-        </a:xfrm>
-      </p:grpSpPr>
-      <p:sp>
-        <p:nvSpPr>
-          <p:cNvPr id="117" name="Google Shape;117;p20"/>
-          <p:cNvSpPr txBox="1"/>
-          <p:nvPr/>
-        </p:nvSpPr>
-        <p:spPr>
-          <a:xfrm>
-            <a:off x="270125" y="310650"/>
-            <a:ext cx="8374200" cy="4494600"/>
-          </a:xfrm>
-          <a:prstGeom prst="rect">
-            <a:avLst/>
-          </a:prstGeom>
-          <a:noFill/>
-          <a:ln>
-            <a:noFill/>
-          </a:ln>
-        </p:spPr>
-        <p:txBody>
-          <a:bodyPr anchorCtr="0" anchor="t" bIns="91425" lIns="91425" spcFirstLastPara="1" rIns="91425" wrap="square" tIns="91425">
-            <a:spAutoFit/>
-          </a:bodyPr>
-          <a:lstStyle/>
-          <a:p>
-            <a:pPr indent="0" lvl="0" marL="0" rtl="0" algn="l">
-              <a:spcBef>
-                <a:spcPts val="0"/>
-              </a:spcBef>
-              <a:spcAft>
-                <a:spcPts val="0"/>
-              </a:spcAft>
-              <a:buNone/>
-            </a:pPr>
-            <a:r>
-              <a:rPr lang="en"/>
-              <a:t>2. Delete image in repo scenario:</a:t>
-            </a:r>
-            <a:endParaRPr/>
-          </a:p>
-          <a:p>
-            <a:pPr indent="0" lvl="0" marL="0" rtl="0" algn="l">
-              <a:spcBef>
-                <a:spcPts val="0"/>
-              </a:spcBef>
-              <a:spcAft>
-                <a:spcPts val="0"/>
-              </a:spcAft>
-              <a:buNone/>
-            </a:pPr>
-            <a:r>
-              <a:rPr lang="en"/>
-              <a:t>How to delete docker images in MECM repo when image is used by some other application package</a:t>
-            </a:r>
-            <a:endParaRPr/>
-          </a:p>
-          <a:p>
-            <a:pPr indent="0" lvl="0" marL="0" rtl="0" algn="l">
-              <a:spcBef>
-                <a:spcPts val="0"/>
-              </a:spcBef>
-              <a:spcAft>
-                <a:spcPts val="0"/>
-              </a:spcAft>
-              <a:buNone/>
-            </a:pPr>
-            <a:r>
-              <a:rPr lang="en"/>
-              <a:t> Possible soln: maintain count for docker image used by application packages. </a:t>
-            </a:r>
-            <a:endParaRPr/>
-          </a:p>
-          <a:p>
-            <a:pPr indent="0" lvl="0" marL="0" rtl="0" algn="l">
-              <a:spcBef>
-                <a:spcPts val="0"/>
-              </a:spcBef>
-              <a:spcAft>
-                <a:spcPts val="0"/>
-              </a:spcAft>
-              <a:buNone/>
-            </a:pPr>
-            <a:r>
-              <a:t/>
-            </a:r>
-            <a:endParaRPr/>
-          </a:p>
-          <a:p>
-            <a:pPr indent="0" lvl="0" marL="0" rtl="0" algn="l">
-              <a:spcBef>
-                <a:spcPts val="0"/>
-              </a:spcBef>
-              <a:spcAft>
-                <a:spcPts val="0"/>
-              </a:spcAft>
-              <a:buNone/>
-            </a:pPr>
-            <a:r>
-              <a:t/>
-            </a:r>
-            <a:endParaRPr/>
-          </a:p>
-          <a:p>
-            <a:pPr indent="0" lvl="0" marL="0" rtl="0" algn="l">
-              <a:spcBef>
-                <a:spcPts val="0"/>
-              </a:spcBef>
-              <a:spcAft>
-                <a:spcPts val="0"/>
-              </a:spcAft>
-              <a:buNone/>
-            </a:pPr>
-            <a:r>
-              <a:t/>
-            </a:r>
-            <a:endParaRPr/>
-          </a:p>
-          <a:p>
-            <a:pPr indent="0" lvl="0" marL="0" rtl="0" algn="l">
-              <a:spcBef>
-                <a:spcPts val="0"/>
-              </a:spcBef>
-              <a:spcAft>
-                <a:spcPts val="0"/>
-              </a:spcAft>
-              <a:buNone/>
-            </a:pPr>
-            <a:r>
-              <a:t/>
-            </a:r>
-            <a:endParaRPr/>
-          </a:p>
-          <a:p>
-            <a:pPr indent="0" lvl="0" marL="0" rtl="0" algn="l">
-              <a:spcBef>
-                <a:spcPts val="0"/>
-              </a:spcBef>
-              <a:spcAft>
-                <a:spcPts val="0"/>
-              </a:spcAft>
-              <a:buNone/>
-            </a:pPr>
-            <a:r>
-              <a:rPr lang="en"/>
-              <a:t>3. mechanism to store app store repo password in DB:</a:t>
-            </a:r>
-            <a:endParaRPr/>
-          </a:p>
-          <a:p>
-            <a:pPr indent="0" lvl="0" marL="0" rtl="0" algn="l">
-              <a:spcBef>
-                <a:spcPts val="0"/>
-              </a:spcBef>
-              <a:spcAft>
-                <a:spcPts val="0"/>
-              </a:spcAft>
-              <a:buNone/>
-            </a:pPr>
-            <a:r>
-              <a:rPr lang="en"/>
-              <a:t>How to get master key used to encrypt/decrypt app store repo password</a:t>
-            </a:r>
-            <a:endParaRPr/>
-          </a:p>
-          <a:p>
-            <a:pPr indent="0" lvl="0" marL="0" rtl="0" algn="l">
-              <a:spcBef>
-                <a:spcPts val="0"/>
-              </a:spcBef>
-              <a:spcAft>
-                <a:spcPts val="0"/>
-              </a:spcAft>
-              <a:buNone/>
-            </a:pPr>
-            <a:r>
-              <a:t/>
-            </a:r>
-            <a:endParaRPr/>
-          </a:p>
-          <a:p>
-            <a:pPr indent="0" lvl="0" marL="0" rtl="0" algn="l">
-              <a:spcBef>
-                <a:spcPts val="0"/>
-              </a:spcBef>
-              <a:spcAft>
-                <a:spcPts val="0"/>
-              </a:spcAft>
-              <a:buNone/>
-            </a:pPr>
-            <a:r>
-              <a:t/>
-            </a:r>
-            <a:endParaRPr/>
-          </a:p>
-          <a:p>
-            <a:pPr indent="0" lvl="0" marL="0" rtl="0" algn="l">
-              <a:spcBef>
-                <a:spcPts val="0"/>
-              </a:spcBef>
-              <a:spcAft>
-                <a:spcPts val="0"/>
-              </a:spcAft>
-              <a:buNone/>
-            </a:pPr>
-            <a:r>
-              <a:t/>
-            </a:r>
-            <a:endParaRPr/>
-          </a:p>
-          <a:p>
-            <a:pPr indent="0" lvl="0" marL="0" rtl="0" algn="l">
-              <a:spcBef>
-                <a:spcPts val="0"/>
-              </a:spcBef>
-              <a:spcAft>
-                <a:spcPts val="0"/>
-              </a:spcAft>
-              <a:buNone/>
-            </a:pPr>
-            <a:r>
-              <a:rPr lang="en">
-                <a:solidFill>
-                  <a:schemeClr val="dk1"/>
-                </a:solidFill>
-              </a:rPr>
-              <a:t>4. </a:t>
-            </a:r>
-            <a:r>
-              <a:rPr lang="en">
-                <a:solidFill>
-                  <a:schemeClr val="dk1"/>
-                </a:solidFill>
-              </a:rPr>
-              <a:t>mechanism to store MECM repo password in APM</a:t>
-            </a:r>
-            <a:endParaRPr>
-              <a:solidFill>
-                <a:schemeClr val="dk1"/>
-              </a:solidFill>
-            </a:endParaRPr>
-          </a:p>
-          <a:p>
-            <a:pPr indent="0" lvl="0" marL="0" rtl="0" algn="l">
-              <a:spcBef>
-                <a:spcPts val="0"/>
-              </a:spcBef>
-              <a:spcAft>
-                <a:spcPts val="0"/>
-              </a:spcAft>
-              <a:buNone/>
-            </a:pPr>
-            <a:r>
-              <a:rPr lang="en">
-                <a:solidFill>
-                  <a:schemeClr val="dk1"/>
-                </a:solidFill>
-              </a:rPr>
-              <a:t>APM communicate with MECM repo, how to  get masterkey and password and how to store ? </a:t>
-            </a:r>
-            <a:endParaRPr>
-              <a:solidFill>
-                <a:schemeClr val="dk1"/>
-              </a:solidFill>
-            </a:endParaRPr>
-          </a:p>
-          <a:p>
-            <a:pPr indent="0" lvl="0" marL="0" rtl="0" algn="l">
-              <a:spcBef>
-                <a:spcPts val="0"/>
-              </a:spcBef>
-              <a:spcAft>
-                <a:spcPts val="0"/>
-              </a:spcAft>
-              <a:buNone/>
-            </a:pPr>
-            <a:r>
-              <a:t/>
-            </a:r>
-            <a:endParaRPr>
-              <a:solidFill>
-                <a:schemeClr val="dk1"/>
-              </a:solidFill>
-            </a:endParaRPr>
-          </a:p>
-          <a:p>
-            <a:pPr indent="0" lvl="0" marL="0" rtl="0" algn="l">
-              <a:spcBef>
-                <a:spcPts val="0"/>
-              </a:spcBef>
-              <a:spcAft>
-                <a:spcPts val="0"/>
-              </a:spcAft>
-              <a:buNone/>
-            </a:pPr>
-            <a:r>
-              <a:t/>
-            </a:r>
-            <a:endParaRPr>
-              <a:solidFill>
-                <a:schemeClr val="dk1"/>
-              </a:solidFill>
-            </a:endParaRPr>
-          </a:p>
-          <a:p>
-            <a:pPr indent="0" lvl="0" marL="0" rtl="0" algn="l">
-              <a:spcBef>
-                <a:spcPts val="0"/>
-              </a:spcBef>
-              <a:spcAft>
-                <a:spcPts val="0"/>
-              </a:spcAft>
-              <a:buNone/>
-            </a:pPr>
-            <a:r>
-              <a:t/>
-            </a:r>
-            <a:endParaRPr>
-              <a:solidFill>
-                <a:schemeClr val="dk1"/>
-              </a:solidFill>
-            </a:endParaRPr>
-          </a:p>
-          <a:p>
-            <a:pPr indent="0" lvl="0" marL="0" rtl="0" algn="l">
-              <a:spcBef>
-                <a:spcPts val="0"/>
-              </a:spcBef>
-              <a:spcAft>
-                <a:spcPts val="0"/>
-              </a:spcAft>
-              <a:buClr>
-                <a:schemeClr val="dk1"/>
-              </a:buClr>
-              <a:buSzPts val="1100"/>
-              <a:buFont typeface="Arial"/>
-              <a:buNone/>
-            </a:pPr>
-            <a:r>
-              <a:rPr lang="en">
-                <a:solidFill>
-                  <a:schemeClr val="dk1"/>
-                </a:solidFill>
-              </a:rPr>
-              <a:t>5. Edge will pull docker images from MECM repo during instantiation, Edge docker should be logged in to MECM repo  prior to app instantiation, this is done as part of edgegallery deployment using deployment scripts ?</a:t>
-            </a:r>
-            <a:endParaRPr>
-              <a:solidFill>
-                <a:schemeClr val="dk1"/>
-              </a:solidFill>
-            </a:endParaRPr>
-          </a:p>
-        </p:txBody>
-      </p:sp>
-    </p:spTree>
-  </p:cSld>
-  <p:clrMapOvr>
-    <a:masterClrMapping/>
-  </p:clrMapOvr>
-</p:sld>
+<file path=ppt/theme/theme1.xml><?xml version="1.0" encoding="utf-8"?>
+<a:theme xmlns:a="http://schemas.openxmlformats.org/drawingml/2006/main" xmlns:r="http://schemas.openxmlformats.org/officeDocument/2006/relationships" name="Simple Light">
+  <a:themeElements>
+    <a:clrScheme name="Simple Light">
+      <a:dk1>
+        <a:srgbClr val="000000"/>
+      </a:dk1>
+      <a:lt1>
+        <a:srgbClr val="FFFFFF"/>
+      </a:lt1>
+      <a:dk2>
+        <a:srgbClr val="595959"/>
+      </a:dk2>
+      <a:lt2>
+        <a:srgbClr val="EEEEEE"/>
+      </a:lt2>
+      <a:accent1>
+        <a:srgbClr val="4285F4"/>
+      </a:accent1>
+      <a:accent2>
+        <a:srgbClr val="212121"/>
+      </a:accent2>
+      <a:accent3>
+        <a:srgbClr val="78909C"/>
+      </a:accent3>
+      <a:accent4>
+        <a:srgbClr val="FFAB40"/>
+      </a:accent4>
+      <a:accent5>
+        <a:srgbClr val="0097A7"/>
+      </a:accent5>
+      <a:accent6>
+        <a:srgbClr val="EEFF41"/>
+      </a:accent6>
+      <a:hlink>
+        <a:srgbClr val="0097A7"/>
+      </a:hlink>
+      <a:folHlink>
+        <a:srgbClr val="0097A7"/>
+      </a:folHlink>
+    </a:clrScheme>
+    <a:fontScheme name="Office">
+      <a:majorFont>
+        <a:latin typeface="Arial"/>
+        <a:ea typeface=""/>
+        <a:cs typeface=""/>
+        <a:font script="Jpan" typeface="ＭＳ Ｐゴシック"/>
+        <a:font script="Hang" typeface="맑은 고딕"/>
+        <a:font script="Hans" typeface="宋体"/>
+        <a:font script="Hant" typeface="新細明體"/>
+        <a:font script="Arab" typeface="Times New Roman"/>
+        <a:font script="Hebr" typeface="Times New Roman"/>
+        <a:font script="Thai" typeface="Angsana New"/>
+        <a:font script="Ethi" typeface="Nyala"/>
+        <a:font script="Beng" typeface="Vrinda"/>
+        <a:font script="Gujr" typeface="Shruti"/>
+        <a:font script="Khmr" typeface="MoolBoran"/>
+        <a:font script="Knda" typeface="Tunga"/>
+        <a:font script="Guru" typeface="Raavi"/>
+        <a:font script="Cans" typeface="Euphemia"/>
+        <a:font script="Cher" typeface="Plantagenet Cherokee"/>
+        <a:font script="Yiii" typeface="Microsoft Yi Baiti"/>
+        <a:font script="Tibt" typeface="Microsoft Himalaya"/>
+        <a:font script="Thaa" typeface="MV Boli"/>
+        <a:font script="Deva" typeface="Mangal"/>
+        <a:font script="Telu" typeface="Gautami"/>
+        <a:font script="Taml" typeface="Latha"/>
+        <a:font script="Syrc" typeface="Estrangelo Edessa"/>
+        <a:font script="Orya" typeface="Kalinga"/>
+        <a:font script="Mlym" typeface="Kartika"/>
+        <a:font script="Laoo" typeface="DokChampa"/>
+        <a:font script="Sinh" typeface="Iskoola Pota"/>
+        <a:font script="Mong" typeface="Mongolian Baiti"/>
+        <a:font script="Viet" typeface="Times New Roman"/>
+        <a:font script="Uigh" typeface="Microsoft Uighur"/>
+        <a:font script="Geor" typeface="Sylfaen"/>
+      </a:majorFont>
+      <a:minorFont>
+        <a:latin typeface="Arial"/>
+        <a:ea typeface=""/>
+        <a:cs typeface=""/>
+        <a:font script="Jpan" typeface="ＭＳ Ｐゴシック"/>
+        <a:font script="Hang" typeface="맑은 고딕"/>
+        <a:font script="Hans" typeface="宋体"/>
+        <a:font script="Hant" typeface="新細明體"/>
+        <a:font script="Arab" typeface="Arial"/>
+        <a:font script="Hebr" typeface="Arial"/>
+        <a:font script="Thai" typeface="Cordia New"/>
+        <a:font script="Ethi" typeface="Nyala"/>
+        <a:font script="Beng" typeface="Vrinda"/>
+        <a:font script="Gujr" typeface="Shruti"/>
+        <a:font script="Khmr" typeface="DaunPenh"/>
+        <a:font script="Knda" typeface="Tunga"/>
+        <a:font script="Guru" typeface="Raavi"/>
+        <a:font script="Cans" typeface="Euphemia"/>
+        <a:font script="Cher" typeface="Plantagenet Cherokee"/>
+        <a:font script="Yiii" typeface="Microsoft Yi Baiti"/>
+        <a:font script="Tibt" typeface="Microsoft Himalaya"/>
+        <a:font script="Thaa" typeface="MV Boli"/>
+        <a:font script="Deva" typeface="Mangal"/>
+        <a:font script="Telu" typeface="Gautami"/>
+        <a:font script="Taml" typeface="Latha"/>
+        <a:font script="Syrc" typeface="Estrangelo Edessa"/>
+        <a:font script="Orya" typeface="Kalinga"/>
+        <a:font script="Mlym" typeface="Kartika"/>
+        <a:font script="Laoo" typeface="DokChampa"/>
+        <a:font script="Sinh" typeface="Iskoola Pota"/>
+        <a:font script="Mong" typeface="Mongolian Baiti"/>
+        <a:font script="Viet" typeface="Arial"/>
+        <a:font script="Uigh" typeface="Microsoft Uighur"/>
+        <a:font script="Geor" typeface="Sylfaen"/>
+      </a:minorFont>
+    </a:fontScheme>
+    <a:fmtScheme name="Office">
+      <a:fillStyleLst>
+        <a:solidFill>
+          <a:schemeClr val="phClr"/>
+        </a:solidFill>
+        <a:gradFill rotWithShape="1">
+          <a:gsLst>
+            <a:gs pos="0">
+              <a:schemeClr val="phClr">
+                <a:tint val="50000"/>
+                <a:satMod val="300000"/>
+              </a:schemeClr>
+            </a:gs>
+            <a:gs pos="35000">
+              <a:schemeClr val="phClr">
+                <a:tint val="37000"/>
+                <a:satMod val="300000"/>
+              </a:schemeClr>
+            </a:gs>
+            <a:gs pos="100000">
+              <a:schemeClr val="phClr">
+                <a:tint val="15000"/>
+                <a:satMod val="350000"/>
+              </a:schemeClr>
+            </a:gs>
+          </a:gsLst>
+          <a:lin ang="16200000" scaled="1"/>
+        </a:gradFill>
+        <a:gradFill rotWithShape="1">
+          <a:gsLst>
+            <a:gs pos="0">
+              <a:schemeClr val="phClr">
+                <a:tint val="100000"/>
+                <a:shade val="100000"/>
+                <a:satMod val="130000"/>
+              </a:schemeClr>
+            </a:gs>
+            <a:gs pos="100000">
+              <a:schemeClr val="phClr">
+                <a:tint val="50000"/>
+                <a:shade val="100000"/>
+                <a:satMod val="350000"/>
+              </a:schemeClr>
+            </a:gs>
+          </a:gsLst>
+          <a:lin ang="16200000" scaled="0"/>
+        </a:gradFill>
+      </a:fillStyleLst>
+      <a:lnStyleLst>
+        <a:ln w="9525" cap="flat" cmpd="sng" algn="ctr">
+          <a:solidFill>
+            <a:schemeClr val="phClr">
+              <a:shade val="95000"/>
+              <a:satMod val="105000"/>
+            </a:schemeClr>
+          </a:solidFill>
+          <a:prstDash val="solid"/>
+        </a:ln>
+        <a:ln w="25400" cap="flat" cmpd="sng" algn="ctr">
+          <a:solidFill>
+            <a:schemeClr val="phClr"/>
+          </a:solidFill>
+          <a:prstDash val="solid"/>
+        </a:ln>
+        <a:ln w="38100" cap="flat" cmpd="sng" algn="ctr">
+          <a:solidFill>
+            <a:schemeClr val="phClr"/>
+          </a:solidFill>
+          <a:prstDash val="solid"/>
+        </a:ln>
+      </a:lnStyleLst>
+      <a:effectStyleLst>
+        <a:effectStyle>
+          <a:effectLst>
+            <a:outerShdw blurRad="40000" dist="20000" dir="5400000" rotWithShape="0">
+              <a:srgbClr val="000000">
+                <a:alpha val="38000"/>
+              </a:srgbClr>
+            </a:outerShdw>
+          </a:effectLst>
+        </a:effectStyle>
+        <a:effectStyle>
+          <a:effectLst>
+            <a:outerShdw blurRad="40000" dist="23000" dir="5400000" rotWithShape="0">
+              <a:srgbClr val="000000">
+                <a:alpha val="35000"/>
+              </a:srgbClr>
+            </a:outerShdw>
+          </a:effectLst>
+        </a:effectStyle>
+        <a:effectStyle>
+          <a:effectLst>
+            <a:outerShdw blurRad="40000" dist="23000" dir="5400000" rotWithShape="0">
+              <a:srgbClr val="000000">
+                <a:alpha val="35000"/>
+              </a:srgbClr>
+            </a:outerShdw>
+          </a:effectLst>
+          <a:scene3d>
+            <a:camera prst="orthographicFront">
+              <a:rot lat="0" lon="0" rev="0"/>
+            </a:camera>
+            <a:lightRig rig="threePt" dir="t">
+              <a:rot lat="0" lon="0" rev="1200000"/>
+            </a:lightRig>
+          </a:scene3d>
+          <a:sp3d>
+            <a:bevelT w="63500" h="25400"/>
+          </a:sp3d>
+        </a:effectStyle>
+      </a:effectStyleLst>
+      <a:bgFillStyleLst>
+        <a:solidFill>
+          <a:schemeClr val="phClr"/>
+        </a:solidFill>
+        <a:gradFill rotWithShape="1">
+          <a:gsLst>
+            <a:gs pos="0">
+              <a:schemeClr val="phClr">
+                <a:tint val="40000"/>
+                <a:satMod val="350000"/>
+              </a:schemeClr>
+            </a:gs>
+            <a:gs pos="40000">
+              <a:schemeClr val="phClr">
+                <a:tint val="45000"/>
+                <a:shade val="99000"/>
+                <a:satMod val="350000"/>
+              </a:schemeClr>
+            </a:gs>
+            <a:gs pos="100000">
+              <a:schemeClr val="phClr">
+                <a:shade val="20000"/>
+                <a:satMod val="255000"/>
+              </a:schemeClr>
+            </a:gs>
+          </a:gsLst>
+          <a:path path="circle">
+            <a:fillToRect l="50000" t="-80000" r="50000" b="180000"/>
+          </a:path>
+        </a:gradFill>
+        <a:gradFill rotWithShape="1">
+          <a:gsLst>
+            <a:gs pos="0">
+              <a:schemeClr val="phClr">
+                <a:tint val="80000"/>
+                <a:satMod val="300000"/>
+              </a:schemeClr>
+            </a:gs>
+            <a:gs pos="100000">
+              <a:schemeClr val="phClr">
+                <a:shade val="30000"/>
+                <a:satMod val="200000"/>
+              </a:schemeClr>
+            </a:gs>
+          </a:gsLst>
+          <a:path path="circle">
+            <a:fillToRect l="50000" t="50000" r="50000" b="50000"/>
+          </a:path>
+        </a:gradFill>
+      </a:bgFillStyleLst>
+    </a:fmtScheme>
+  </a:themeElements>
+</a:theme>
 </file>
 
-<file path=ppt/slides/slide9.xml><?xml version="1.0" encoding="utf-8"?>
-<p:sld xmlns:a="http://schemas.openxmlformats.org/drawingml/2006/main" xmlns:r="http://schemas.openxmlformats.org/officeDocument/2006/relationships" xmlns:mc="http://schemas.openxmlformats.org/markup-compatibility/2006" xmlns:mv="urn:schemas-microsoft-com:mac:vml" xmlns:p="http://schemas.openxmlformats.org/presentationml/2006/main" xmlns:c="http://schemas.openxmlformats.org/drawingml/2006/chart" xmlns:dgm="http://schemas.openxmlformats.org/drawingml/2006/diagram" xmlns:o="urn:schemas-microsoft-com:office:office" xmlns:v="urn:schemas-microsoft-com:vml" xmlns:pvml="urn:schemas-microsoft-com:office:powerpoint" xmlns:com="http://schemas.openxmlformats.org/drawingml/2006/compatibility" xmlns:p14="http://schemas.microsoft.com/office/powerpoint/2010/main" xmlns:p15="http://schemas.microsoft.com/office/powerpoint/2012/main" xmlns:ahyp="http://schemas.microsoft.com/office/drawing/2018/hyperlinkcolor">
-  <p:cSld>
-    <p:spTree>
-      <p:nvGrpSpPr>
-        <p:cNvPr id="121" name="Shape 121"/>
-        <p:cNvGrpSpPr/>
-        <p:nvPr/>
-      </p:nvGrpSpPr>
-      <p:grpSpPr>
-        <a:xfrm>
-          <a:off x="0" y="0"/>
-          <a:ext cx="0" cy="0"/>
-          <a:chOff x="0" y="0"/>
-          <a:chExt cx="0" cy="0"/>
-        </a:xfrm>
-      </p:grpSpPr>
-      <p:sp>
-        <p:nvSpPr>
-          <p:cNvPr id="122" name="Google Shape;122;p21"/>
-          <p:cNvSpPr txBox="1"/>
-          <p:nvPr>
-            <p:ph type="ctrTitle"/>
-          </p:nvPr>
-        </p:nvSpPr>
-        <p:spPr>
-          <a:xfrm>
-            <a:off x="311708" y="744575"/>
-            <a:ext cx="8520600" cy="2052600"/>
-          </a:xfrm>
-          <a:prstGeom prst="rect">
-            <a:avLst/>
-          </a:prstGeom>
-        </p:spPr>
-        <p:txBody>
-          <a:bodyPr anchorCtr="0" anchor="b" bIns="91425" lIns="91425" spcFirstLastPara="1" rIns="91425" wrap="square" tIns="91425">
-            <a:normAutofit/>
-          </a:bodyPr>
-          <a:lstStyle/>
-          <a:p>
-            <a:pPr indent="0" lvl="0" marL="0" rtl="0" algn="ctr">
-              <a:spcBef>
-                <a:spcPts val="0"/>
-              </a:spcBef>
-              <a:spcAft>
-                <a:spcPts val="0"/>
-              </a:spcAft>
-              <a:buNone/>
-            </a:pPr>
-            <a:r>
-              <a:rPr lang="en"/>
-              <a:t>Thank you</a:t>
-            </a:r>
-            <a:endParaRPr/>
-          </a:p>
-        </p:txBody>
-      </p:sp>
-    </p:spTree>
-  </p:cSld>
-  <p:clrMapOvr>
-    <a:masterClrMapping/>
-  </p:clrMapOvr>
-</p:sld>
-</file>
-
-<file path=ppt/theme/theme1.xml><?xml version="1.0" encoding="utf-8"?>
+<file path=ppt/theme/theme2.xml><?xml version="1.0" encoding="utf-8"?>
 <a:theme xmlns:a="http://schemas.openxmlformats.org/drawingml/2006/main" xmlns:r="http://schemas.openxmlformats.org/officeDocument/2006/relationships">
   <a:themeElements>
     <a:clrScheme name="Default">
@@ -11193,283 +12153,4 @@
     </a:fmtScheme>
   </a:themeElements>
 </a:theme>
-</file>
-
-<file path=ppt/theme/theme2.xml><?xml version="1.0" encoding="utf-8"?>
-<a:theme xmlns:a="http://schemas.openxmlformats.org/drawingml/2006/main" xmlns:r="http://schemas.openxmlformats.org/officeDocument/2006/relationships" name="Simple Light">
-  <a:themeElements>
-    <a:clrScheme name="Simple Light">
-      <a:dk1>
-        <a:srgbClr val="000000"/>
-      </a:dk1>
-      <a:lt1>
-        <a:srgbClr val="FFFFFF"/>
-      </a:lt1>
-      <a:dk2>
-        <a:srgbClr val="595959"/>
-      </a:dk2>
-      <a:lt2>
-        <a:srgbClr val="EEEEEE"/>
-      </a:lt2>
-      <a:accent1>
-        <a:srgbClr val="4285F4"/>
-      </a:accent1>
-      <a:accent2>
-        <a:srgbClr val="212121"/>
-      </a:accent2>
-      <a:accent3>
-        <a:srgbClr val="78909C"/>
-      </a:accent3>
-      <a:accent4>
-        <a:srgbClr val="FFAB40"/>
-      </a:accent4>
-      <a:accent5>
-        <a:srgbClr val="0097A7"/>
-      </a:accent5>
-      <a:accent6>
-        <a:srgbClr val="EEFF41"/>
-      </a:accent6>
-      <a:hlink>
-        <a:srgbClr val="0097A7"/>
-      </a:hlink>
-      <a:folHlink>
-        <a:srgbClr val="0097A7"/>
-      </a:folHlink>
-    </a:clrScheme>
-    <a:fontScheme name="Office">
-      <a:majorFont>
-        <a:latin typeface="Arial"/>
-        <a:ea typeface=""/>
-        <a:cs typeface=""/>
-        <a:font script="Jpan" typeface="ＭＳ Ｐゴシック"/>
-        <a:font script="Hang" typeface="맑은 고딕"/>
-        <a:font script="Hans" typeface="宋体"/>
-        <a:font script="Hant" typeface="新細明體"/>
-        <a:font script="Arab" typeface="Times New Roman"/>
-        <a:font script="Hebr" typeface="Times New Roman"/>
-        <a:font script="Thai" typeface="Angsana New"/>
-        <a:font script="Ethi" typeface="Nyala"/>
-        <a:font script="Beng" typeface="Vrinda"/>
-        <a:font script="Gujr" typeface="Shruti"/>
-        <a:font script="Khmr" typeface="MoolBoran"/>
-        <a:font script="Knda" typeface="Tunga"/>
-        <a:font script="Guru" typeface="Raavi"/>
-        <a:font script="Cans" typeface="Euphemia"/>
-        <a:font script="Cher" typeface="Plantagenet Cherokee"/>
-        <a:font script="Yiii" typeface="Microsoft Yi Baiti"/>
-        <a:font script="Tibt" typeface="Microsoft Himalaya"/>
-        <a:font script="Thaa" typeface="MV Boli"/>
-        <a:font script="Deva" typeface="Mangal"/>
-        <a:font script="Telu" typeface="Gautami"/>
-        <a:font script="Taml" typeface="Latha"/>
-        <a:font script="Syrc" typeface="Estrangelo Edessa"/>
-        <a:font script="Orya" typeface="Kalinga"/>
-        <a:font script="Mlym" typeface="Kartika"/>
-        <a:font script="Laoo" typeface="DokChampa"/>
-        <a:font script="Sinh" typeface="Iskoola Pota"/>
-        <a:font script="Mong" typeface="Mongolian Baiti"/>
-        <a:font script="Viet" typeface="Times New Roman"/>
-        <a:font script="Uigh" typeface="Microsoft Uighur"/>
-        <a:font script="Geor" typeface="Sylfaen"/>
-      </a:majorFont>
-      <a:minorFont>
-        <a:latin typeface="Arial"/>
-        <a:ea typeface=""/>
-        <a:cs typeface=""/>
-        <a:font script="Jpan" typeface="ＭＳ Ｐゴシック"/>
-        <a:font script="Hang" typeface="맑은 고딕"/>
-        <a:font script="Hans" typeface="宋体"/>
-        <a:font script="Hant" typeface="新細明體"/>
-        <a:font script="Arab" typeface="Arial"/>
-        <a:font script="Hebr" typeface="Arial"/>
-        <a:font script="Thai" typeface="Cordia New"/>
-        <a:font script="Ethi" typeface="Nyala"/>
-        <a:font script="Beng" typeface="Vrinda"/>
-        <a:font script="Gujr" typeface="Shruti"/>
-        <a:font script="Khmr" typeface="DaunPenh"/>
-        <a:font script="Knda" typeface="Tunga"/>
-        <a:font script="Guru" typeface="Raavi"/>
-        <a:font script="Cans" typeface="Euphemia"/>
-        <a:font script="Cher" typeface="Plantagenet Cherokee"/>
-        <a:font script="Yiii" typeface="Microsoft Yi Baiti"/>
-        <a:font script="Tibt" typeface="Microsoft Himalaya"/>
-        <a:font script="Thaa" typeface="MV Boli"/>
-        <a:font script="Deva" typeface="Mangal"/>
-        <a:font script="Telu" typeface="Gautami"/>
-        <a:font script="Taml" typeface="Latha"/>
-        <a:font script="Syrc" typeface="Estrangelo Edessa"/>
-        <a:font script="Orya" typeface="Kalinga"/>
-        <a:font script="Mlym" typeface="Kartika"/>
-        <a:font script="Laoo" typeface="DokChampa"/>
-        <a:font script="Sinh" typeface="Iskoola Pota"/>
-        <a:font script="Mong" typeface="Mongolian Baiti"/>
-        <a:font script="Viet" typeface="Arial"/>
-        <a:font script="Uigh" typeface="Microsoft Uighur"/>
-        <a:font script="Geor" typeface="Sylfaen"/>
-      </a:minorFont>
-    </a:fontScheme>
-    <a:fmtScheme name="Office">
-      <a:fillStyleLst>
-        <a:solidFill>
-          <a:schemeClr val="phClr"/>
-        </a:solidFill>
-        <a:gradFill rotWithShape="1">
-          <a:gsLst>
-            <a:gs pos="0">
-              <a:schemeClr val="phClr">
-                <a:tint val="50000"/>
-                <a:satMod val="300000"/>
-              </a:schemeClr>
-            </a:gs>
-            <a:gs pos="35000">
-              <a:schemeClr val="phClr">
-                <a:tint val="37000"/>
-                <a:satMod val="300000"/>
-              </a:schemeClr>
-            </a:gs>
-            <a:gs pos="100000">
-              <a:schemeClr val="phClr">
-                <a:tint val="15000"/>
-                <a:satMod val="350000"/>
-              </a:schemeClr>
-            </a:gs>
-          </a:gsLst>
-          <a:lin ang="16200000" scaled="1"/>
-        </a:gradFill>
-        <a:gradFill rotWithShape="1">
-          <a:gsLst>
-            <a:gs pos="0">
-              <a:schemeClr val="phClr">
-                <a:tint val="100000"/>
-                <a:shade val="100000"/>
-                <a:satMod val="130000"/>
-              </a:schemeClr>
-            </a:gs>
-            <a:gs pos="100000">
-              <a:schemeClr val="phClr">
-                <a:tint val="50000"/>
-                <a:shade val="100000"/>
-                <a:satMod val="350000"/>
-              </a:schemeClr>
-            </a:gs>
-          </a:gsLst>
-          <a:lin ang="16200000" scaled="0"/>
-        </a:gradFill>
-      </a:fillStyleLst>
-      <a:lnStyleLst>
-        <a:ln w="9525" cap="flat" cmpd="sng" algn="ctr">
-          <a:solidFill>
-            <a:schemeClr val="phClr">
-              <a:shade val="95000"/>
-              <a:satMod val="105000"/>
-            </a:schemeClr>
-          </a:solidFill>
-          <a:prstDash val="solid"/>
-        </a:ln>
-        <a:ln w="25400" cap="flat" cmpd="sng" algn="ctr">
-          <a:solidFill>
-            <a:schemeClr val="phClr"/>
-          </a:solidFill>
-          <a:prstDash val="solid"/>
-        </a:ln>
-        <a:ln w="38100" cap="flat" cmpd="sng" algn="ctr">
-          <a:solidFill>
-            <a:schemeClr val="phClr"/>
-          </a:solidFill>
-          <a:prstDash val="solid"/>
-        </a:ln>
-      </a:lnStyleLst>
-      <a:effectStyleLst>
-        <a:effectStyle>
-          <a:effectLst>
-            <a:outerShdw blurRad="40000" dist="20000" dir="5400000" rotWithShape="0">
-              <a:srgbClr val="000000">
-                <a:alpha val="38000"/>
-              </a:srgbClr>
-            </a:outerShdw>
-          </a:effectLst>
-        </a:effectStyle>
-        <a:effectStyle>
-          <a:effectLst>
-            <a:outerShdw blurRad="40000" dist="23000" dir="5400000" rotWithShape="0">
-              <a:srgbClr val="000000">
-                <a:alpha val="35000"/>
-              </a:srgbClr>
-            </a:outerShdw>
-          </a:effectLst>
-        </a:effectStyle>
-        <a:effectStyle>
-          <a:effectLst>
-            <a:outerShdw blurRad="40000" dist="23000" dir="5400000" rotWithShape="0">
-              <a:srgbClr val="000000">
-                <a:alpha val="35000"/>
-              </a:srgbClr>
-            </a:outerShdw>
-          </a:effectLst>
-          <a:scene3d>
-            <a:camera prst="orthographicFront">
-              <a:rot lat="0" lon="0" rev="0"/>
-            </a:camera>
-            <a:lightRig rig="threePt" dir="t">
-              <a:rot lat="0" lon="0" rev="1200000"/>
-            </a:lightRig>
-          </a:scene3d>
-          <a:sp3d>
-            <a:bevelT w="63500" h="25400"/>
-          </a:sp3d>
-        </a:effectStyle>
-      </a:effectStyleLst>
-      <a:bgFillStyleLst>
-        <a:solidFill>
-          <a:schemeClr val="phClr"/>
-        </a:solidFill>
-        <a:gradFill rotWithShape="1">
-          <a:gsLst>
-            <a:gs pos="0">
-              <a:schemeClr val="phClr">
-                <a:tint val="40000"/>
-                <a:satMod val="350000"/>
-              </a:schemeClr>
-            </a:gs>
-            <a:gs pos="40000">
-              <a:schemeClr val="phClr">
-                <a:tint val="45000"/>
-                <a:shade val="99000"/>
-                <a:satMod val="350000"/>
-              </a:schemeClr>
-            </a:gs>
-            <a:gs pos="100000">
-              <a:schemeClr val="phClr">
-                <a:shade val="20000"/>
-                <a:satMod val="255000"/>
-              </a:schemeClr>
-            </a:gs>
-          </a:gsLst>
-          <a:path path="circle">
-            <a:fillToRect l="50000" t="-80000" r="50000" b="180000"/>
-          </a:path>
-        </a:gradFill>
-        <a:gradFill rotWithShape="1">
-          <a:gsLst>
-            <a:gs pos="0">
-              <a:schemeClr val="phClr">
-                <a:tint val="80000"/>
-                <a:satMod val="300000"/>
-              </a:schemeClr>
-            </a:gs>
-            <a:gs pos="100000">
-              <a:schemeClr val="phClr">
-                <a:shade val="30000"/>
-                <a:satMod val="200000"/>
-              </a:schemeClr>
-            </a:gs>
-          </a:gsLst>
-          <a:path path="circle">
-            <a:fillToRect l="50000" t="50000" r="50000" b="50000"/>
-          </a:path>
-        </a:gradFill>
-      </a:bgFillStyleLst>
-    </a:fmtScheme>
-  </a:themeElements>
-</a:theme>
 </file>
</xml_diff>

<commit_message>
image mgmt lld update
</commit_message>
<xml_diff>
--- a/MECM PT/Release V1.1/Image Management-LLD.pptx
+++ b/MECM PT/Release V1.1/Image Management-LLD.pptx
@@ -805,7 +805,7 @@
   <p:cSld>
     <p:spTree>
       <p:nvGrpSpPr>
-        <p:cNvPr id="138" name="Shape 138"/>
+        <p:cNvPr id="139" name="Shape 139"/>
         <p:cNvGrpSpPr/>
         <p:nvPr/>
       </p:nvGrpSpPr>
@@ -819,7 +819,7 @@
       </p:grpSpPr>
       <p:sp>
         <p:nvSpPr>
-          <p:cNvPr id="139" name="Google Shape;139;gb5f49f7757_0_66:notes"/>
+          <p:cNvPr id="140" name="Google Shape;140;gb5f49f7757_0_66:notes"/>
           <p:cNvSpPr/>
           <p:nvPr>
             <p:ph idx="2" type="sldImg"/>
@@ -854,7 +854,7 @@
       </p:sp>
       <p:sp>
         <p:nvSpPr>
-          <p:cNvPr id="140" name="Google Shape;140;gb5f49f7757_0_66:notes"/>
+          <p:cNvPr id="141" name="Google Shape;141;gb5f49f7757_0_66:notes"/>
           <p:cNvSpPr txBox="1"/>
           <p:nvPr>
             <p:ph idx="1" type="body"/>
@@ -904,7 +904,7 @@
   <p:cSld>
     <p:spTree>
       <p:nvGrpSpPr>
-        <p:cNvPr id="143" name="Shape 143"/>
+        <p:cNvPr id="144" name="Shape 144"/>
         <p:cNvGrpSpPr/>
         <p:nvPr/>
       </p:nvGrpSpPr>
@@ -918,7 +918,7 @@
       </p:grpSpPr>
       <p:sp>
         <p:nvSpPr>
-          <p:cNvPr id="144" name="Google Shape;144;gb5f49f7757_0_51:notes"/>
+          <p:cNvPr id="145" name="Google Shape;145;gb5f49f7757_0_51:notes"/>
           <p:cNvSpPr/>
           <p:nvPr>
             <p:ph idx="2" type="sldImg"/>
@@ -953,7 +953,7 @@
       </p:sp>
       <p:sp>
         <p:nvSpPr>
-          <p:cNvPr id="145" name="Google Shape;145;gb5f49f7757_0_51:notes"/>
+          <p:cNvPr id="146" name="Google Shape;146;gb5f49f7757_0_51:notes"/>
           <p:cNvSpPr txBox="1"/>
           <p:nvPr>
             <p:ph idx="1" type="body"/>
@@ -1003,7 +1003,7 @@
   <p:cSld>
     <p:spTree>
       <p:nvGrpSpPr>
-        <p:cNvPr id="154" name="Shape 154"/>
+        <p:cNvPr id="155" name="Shape 155"/>
         <p:cNvGrpSpPr/>
         <p:nvPr/>
       </p:nvGrpSpPr>
@@ -1017,7 +1017,7 @@
       </p:grpSpPr>
       <p:sp>
         <p:nvSpPr>
-          <p:cNvPr id="155" name="Google Shape;155;gbdea9fea9c_0_7:notes"/>
+          <p:cNvPr id="156" name="Google Shape;156;gbdea9fea9c_0_7:notes"/>
           <p:cNvSpPr/>
           <p:nvPr>
             <p:ph idx="2" type="sldImg"/>
@@ -1052,7 +1052,7 @@
       </p:sp>
       <p:sp>
         <p:nvSpPr>
-          <p:cNvPr id="156" name="Google Shape;156;gbdea9fea9c_0_7:notes"/>
+          <p:cNvPr id="157" name="Google Shape;157;gbdea9fea9c_0_7:notes"/>
           <p:cNvSpPr txBox="1"/>
           <p:nvPr>
             <p:ph idx="1" type="body"/>
@@ -1102,7 +1102,7 @@
   <p:cSld>
     <p:spTree>
       <p:nvGrpSpPr>
-        <p:cNvPr id="165" name="Shape 165"/>
+        <p:cNvPr id="166" name="Shape 166"/>
         <p:cNvGrpSpPr/>
         <p:nvPr/>
       </p:nvGrpSpPr>
@@ -1116,7 +1116,7 @@
       </p:grpSpPr>
       <p:sp>
         <p:nvSpPr>
-          <p:cNvPr id="166" name="Google Shape;166;gb5f49f7757_0_71:notes"/>
+          <p:cNvPr id="167" name="Google Shape;167;gb5f49f7757_0_71:notes"/>
           <p:cNvSpPr/>
           <p:nvPr>
             <p:ph idx="2" type="sldImg"/>
@@ -1151,7 +1151,7 @@
       </p:sp>
       <p:sp>
         <p:nvSpPr>
-          <p:cNvPr id="167" name="Google Shape;167;gb5f49f7757_0_71:notes"/>
+          <p:cNvPr id="168" name="Google Shape;168;gb5f49f7757_0_71:notes"/>
           <p:cNvSpPr txBox="1"/>
           <p:nvPr>
             <p:ph idx="1" type="body"/>
@@ -1201,7 +1201,7 @@
   <p:cSld>
     <p:spTree>
       <p:nvGrpSpPr>
-        <p:cNvPr id="170" name="Shape 170"/>
+        <p:cNvPr id="171" name="Shape 171"/>
         <p:cNvGrpSpPr/>
         <p:nvPr/>
       </p:nvGrpSpPr>
@@ -1215,7 +1215,7 @@
       </p:grpSpPr>
       <p:sp>
         <p:nvSpPr>
-          <p:cNvPr id="171" name="Google Shape;171;gb5f49f7757_0_90:notes"/>
+          <p:cNvPr id="172" name="Google Shape;172;gb5f49f7757_0_90:notes"/>
           <p:cNvSpPr/>
           <p:nvPr>
             <p:ph idx="2" type="sldImg"/>
@@ -1250,7 +1250,7 @@
       </p:sp>
       <p:sp>
         <p:nvSpPr>
-          <p:cNvPr id="172" name="Google Shape;172;gb5f49f7757_0_90:notes"/>
+          <p:cNvPr id="173" name="Google Shape;173;gb5f49f7757_0_90:notes"/>
           <p:cNvSpPr txBox="1"/>
           <p:nvPr>
             <p:ph idx="1" type="body"/>
@@ -1300,7 +1300,7 @@
   <p:cSld>
     <p:spTree>
       <p:nvGrpSpPr>
-        <p:cNvPr id="175" name="Shape 175"/>
+        <p:cNvPr id="176" name="Shape 176"/>
         <p:cNvGrpSpPr/>
         <p:nvPr/>
       </p:nvGrpSpPr>
@@ -1314,7 +1314,7 @@
       </p:grpSpPr>
       <p:sp>
         <p:nvSpPr>
-          <p:cNvPr id="176" name="Google Shape;176;gb5f49f7757_0_95:notes"/>
+          <p:cNvPr id="177" name="Google Shape;177;gb5f49f7757_0_95:notes"/>
           <p:cNvSpPr/>
           <p:nvPr>
             <p:ph idx="2" type="sldImg"/>
@@ -1349,7 +1349,7 @@
       </p:sp>
       <p:sp>
         <p:nvSpPr>
-          <p:cNvPr id="177" name="Google Shape;177;gb5f49f7757_0_95:notes"/>
+          <p:cNvPr id="178" name="Google Shape;178;gb5f49f7757_0_95:notes"/>
           <p:cNvSpPr txBox="1"/>
           <p:nvPr>
             <p:ph idx="1" type="body"/>
@@ -1399,7 +1399,7 @@
   <p:cSld>
     <p:spTree>
       <p:nvGrpSpPr>
-        <p:cNvPr id="180" name="Shape 180"/>
+        <p:cNvPr id="181" name="Shape 181"/>
         <p:cNvGrpSpPr/>
         <p:nvPr/>
       </p:nvGrpSpPr>
@@ -1413,7 +1413,7 @@
       </p:grpSpPr>
       <p:sp>
         <p:nvSpPr>
-          <p:cNvPr id="181" name="Google Shape;181;gb5f49f7757_0_100:notes"/>
+          <p:cNvPr id="182" name="Google Shape;182;gb5f49f7757_0_100:notes"/>
           <p:cNvSpPr/>
           <p:nvPr>
             <p:ph idx="2" type="sldImg"/>
@@ -1448,7 +1448,7 @@
       </p:sp>
       <p:sp>
         <p:nvSpPr>
-          <p:cNvPr id="182" name="Google Shape;182;gb5f49f7757_0_100:notes"/>
+          <p:cNvPr id="183" name="Google Shape;183;gb5f49f7757_0_100:notes"/>
           <p:cNvSpPr txBox="1"/>
           <p:nvPr>
             <p:ph idx="1" type="body"/>
@@ -1894,7 +1894,7 @@
   <p:cSld>
     <p:spTree>
       <p:nvGrpSpPr>
-        <p:cNvPr id="94" name="Shape 94"/>
+        <p:cNvPr id="95" name="Shape 95"/>
         <p:cNvGrpSpPr/>
         <p:nvPr/>
       </p:nvGrpSpPr>
@@ -1908,7 +1908,7 @@
       </p:grpSpPr>
       <p:sp>
         <p:nvSpPr>
-          <p:cNvPr id="95" name="Google Shape;95;gb5f49f7757_0_1:notes"/>
+          <p:cNvPr id="96" name="Google Shape;96;gb5f49f7757_0_1:notes"/>
           <p:cNvSpPr/>
           <p:nvPr>
             <p:ph idx="2" type="sldImg"/>
@@ -1943,7 +1943,7 @@
       </p:sp>
       <p:sp>
         <p:nvSpPr>
-          <p:cNvPr id="96" name="Google Shape;96;gb5f49f7757_0_1:notes"/>
+          <p:cNvPr id="97" name="Google Shape;97;gb5f49f7757_0_1:notes"/>
           <p:cNvSpPr txBox="1"/>
           <p:nvPr>
             <p:ph idx="1" type="body"/>
@@ -1993,7 +1993,7 @@
   <p:cSld>
     <p:spTree>
       <p:nvGrpSpPr>
-        <p:cNvPr id="99" name="Shape 99"/>
+        <p:cNvPr id="100" name="Shape 100"/>
         <p:cNvGrpSpPr/>
         <p:nvPr/>
       </p:nvGrpSpPr>
@@ -2007,7 +2007,7 @@
       </p:grpSpPr>
       <p:sp>
         <p:nvSpPr>
-          <p:cNvPr id="100" name="Google Shape;100;gbd81eee105_0_0:notes"/>
+          <p:cNvPr id="101" name="Google Shape;101;gbd81eee105_0_0:notes"/>
           <p:cNvSpPr/>
           <p:nvPr>
             <p:ph idx="2" type="sldImg"/>
@@ -2042,7 +2042,7 @@
       </p:sp>
       <p:sp>
         <p:nvSpPr>
-          <p:cNvPr id="101" name="Google Shape;101;gbd81eee105_0_0:notes"/>
+          <p:cNvPr id="102" name="Google Shape;102;gbd81eee105_0_0:notes"/>
           <p:cNvSpPr txBox="1"/>
           <p:nvPr>
             <p:ph idx="1" type="body"/>
@@ -2092,7 +2092,7 @@
   <p:cSld>
     <p:spTree>
       <p:nvGrpSpPr>
-        <p:cNvPr id="117" name="Shape 117"/>
+        <p:cNvPr id="118" name="Shape 118"/>
         <p:cNvGrpSpPr/>
         <p:nvPr/>
       </p:nvGrpSpPr>
@@ -2106,7 +2106,7 @@
       </p:grpSpPr>
       <p:sp>
         <p:nvSpPr>
-          <p:cNvPr id="118" name="Google Shape;118;gb5f49f7757_0_17:notes"/>
+          <p:cNvPr id="119" name="Google Shape;119;gb5f49f7757_0_17:notes"/>
           <p:cNvSpPr/>
           <p:nvPr>
             <p:ph idx="2" type="sldImg"/>
@@ -2141,7 +2141,7 @@
       </p:sp>
       <p:sp>
         <p:nvSpPr>
-          <p:cNvPr id="119" name="Google Shape;119;gb5f49f7757_0_17:notes"/>
+          <p:cNvPr id="120" name="Google Shape;120;gb5f49f7757_0_17:notes"/>
           <p:cNvSpPr txBox="1"/>
           <p:nvPr>
             <p:ph idx="1" type="body"/>
@@ -2191,7 +2191,7 @@
   <p:cSld>
     <p:spTree>
       <p:nvGrpSpPr>
-        <p:cNvPr id="129" name="Shape 129"/>
+        <p:cNvPr id="130" name="Shape 130"/>
         <p:cNvGrpSpPr/>
         <p:nvPr/>
       </p:nvGrpSpPr>
@@ -2205,7 +2205,7 @@
       </p:grpSpPr>
       <p:sp>
         <p:nvSpPr>
-          <p:cNvPr id="130" name="Google Shape;130;gb5f49f7757_0_142:notes"/>
+          <p:cNvPr id="131" name="Google Shape;131;gb5f49f7757_0_142:notes"/>
           <p:cNvSpPr/>
           <p:nvPr>
             <p:ph idx="2" type="sldImg"/>
@@ -2240,7 +2240,7 @@
       </p:sp>
       <p:sp>
         <p:nvSpPr>
-          <p:cNvPr id="131" name="Google Shape;131;gb5f49f7757_0_142:notes"/>
+          <p:cNvPr id="132" name="Google Shape;132;gb5f49f7757_0_142:notes"/>
           <p:cNvSpPr txBox="1"/>
           <p:nvPr>
             <p:ph idx="1" type="body"/>
@@ -7044,7 +7044,7 @@
   <p:cSld>
     <p:spTree>
       <p:nvGrpSpPr>
-        <p:cNvPr id="141" name="Shape 141"/>
+        <p:cNvPr id="142" name="Shape 142"/>
         <p:cNvGrpSpPr/>
         <p:nvPr/>
       </p:nvGrpSpPr>
@@ -7058,7 +7058,7 @@
       </p:grpSpPr>
       <p:sp>
         <p:nvSpPr>
-          <p:cNvPr id="142" name="Google Shape;142;p22"/>
+          <p:cNvPr id="143" name="Google Shape;143;p22"/>
           <p:cNvSpPr txBox="1"/>
           <p:nvPr>
             <p:ph type="ctrTitle"/>
@@ -7109,7 +7109,7 @@
   <p:cSld>
     <p:spTree>
       <p:nvGrpSpPr>
-        <p:cNvPr id="146" name="Shape 146"/>
+        <p:cNvPr id="147" name="Shape 147"/>
         <p:cNvGrpSpPr/>
         <p:nvPr/>
       </p:nvGrpSpPr>
@@ -7123,7 +7123,7 @@
       </p:grpSpPr>
       <p:pic>
         <p:nvPicPr>
-          <p:cNvPr id="147" name="Google Shape;147;p23"/>
+          <p:cNvPr id="148" name="Google Shape;148;p23"/>
           <p:cNvPicPr preferRelativeResize="0"/>
           <p:nvPr/>
         </p:nvPicPr>
@@ -7151,7 +7151,7 @@
       </p:pic>
       <p:pic>
         <p:nvPicPr>
-          <p:cNvPr id="148" name="Google Shape;148;p23"/>
+          <p:cNvPr id="149" name="Google Shape;149;p23"/>
           <p:cNvPicPr preferRelativeResize="0"/>
           <p:nvPr/>
         </p:nvPicPr>
@@ -7179,7 +7179,7 @@
       </p:pic>
       <p:pic>
         <p:nvPicPr>
-          <p:cNvPr id="149" name="Google Shape;149;p23"/>
+          <p:cNvPr id="150" name="Google Shape;150;p23"/>
           <p:cNvPicPr preferRelativeResize="0"/>
           <p:nvPr/>
         </p:nvPicPr>
@@ -7207,7 +7207,7 @@
       </p:pic>
       <p:pic>
         <p:nvPicPr>
-          <p:cNvPr id="150" name="Google Shape;150;p23"/>
+          <p:cNvPr id="151" name="Google Shape;151;p23"/>
           <p:cNvPicPr preferRelativeResize="0"/>
           <p:nvPr/>
         </p:nvPicPr>
@@ -7235,7 +7235,7 @@
       </p:pic>
       <p:sp>
         <p:nvSpPr>
-          <p:cNvPr id="151" name="Google Shape;151;p23"/>
+          <p:cNvPr id="152" name="Google Shape;152;p23"/>
           <p:cNvSpPr txBox="1"/>
           <p:nvPr/>
         </p:nvSpPr>
@@ -7285,7 +7285,7 @@
       </p:sp>
       <p:sp>
         <p:nvSpPr>
-          <p:cNvPr id="152" name="Google Shape;152;p23"/>
+          <p:cNvPr id="153" name="Google Shape;153;p23"/>
           <p:cNvSpPr/>
           <p:nvPr/>
         </p:nvSpPr>
@@ -7335,7 +7335,7 @@
       </p:sp>
       <p:sp>
         <p:nvSpPr>
-          <p:cNvPr id="153" name="Google Shape;153;p23"/>
+          <p:cNvPr id="154" name="Google Shape;154;p23"/>
           <p:cNvSpPr/>
           <p:nvPr/>
         </p:nvSpPr>
@@ -7396,7 +7396,7 @@
   <p:cSld>
     <p:spTree>
       <p:nvGrpSpPr>
-        <p:cNvPr id="157" name="Shape 157"/>
+        <p:cNvPr id="158" name="Shape 158"/>
         <p:cNvGrpSpPr/>
         <p:nvPr/>
       </p:nvGrpSpPr>
@@ -7410,7 +7410,7 @@
       </p:grpSpPr>
       <p:pic>
         <p:nvPicPr>
-          <p:cNvPr id="158" name="Google Shape;158;p24"/>
+          <p:cNvPr id="159" name="Google Shape;159;p24"/>
           <p:cNvPicPr preferRelativeResize="0"/>
           <p:nvPr/>
         </p:nvPicPr>
@@ -7438,7 +7438,7 @@
       </p:pic>
       <p:pic>
         <p:nvPicPr>
-          <p:cNvPr id="159" name="Google Shape;159;p24"/>
+          <p:cNvPr id="160" name="Google Shape;160;p24"/>
           <p:cNvPicPr preferRelativeResize="0"/>
           <p:nvPr/>
         </p:nvPicPr>
@@ -7466,7 +7466,7 @@
       </p:pic>
       <p:sp>
         <p:nvSpPr>
-          <p:cNvPr id="160" name="Google Shape;160;p24"/>
+          <p:cNvPr id="161" name="Google Shape;161;p24"/>
           <p:cNvSpPr txBox="1"/>
           <p:nvPr/>
         </p:nvSpPr>
@@ -7516,7 +7516,7 @@
       </p:sp>
       <p:sp>
         <p:nvSpPr>
-          <p:cNvPr id="161" name="Google Shape;161;p24"/>
+          <p:cNvPr id="162" name="Google Shape;162;p24"/>
           <p:cNvSpPr txBox="1"/>
           <p:nvPr/>
         </p:nvSpPr>
@@ -7574,7 +7574,7 @@
       </p:sp>
       <p:sp>
         <p:nvSpPr>
-          <p:cNvPr id="162" name="Google Shape;162;p24"/>
+          <p:cNvPr id="163" name="Google Shape;163;p24"/>
           <p:cNvSpPr txBox="1"/>
           <p:nvPr/>
         </p:nvSpPr>
@@ -7621,7 +7621,7 @@
       </p:sp>
       <p:cxnSp>
         <p:nvCxnSpPr>
-          <p:cNvPr id="163" name="Google Shape;163;p24"/>
+          <p:cNvPr id="164" name="Google Shape;164;p24"/>
           <p:cNvCxnSpPr/>
           <p:nvPr/>
         </p:nvCxnSpPr>
@@ -7647,7 +7647,7 @@
       </p:cxnSp>
       <p:cxnSp>
         <p:nvCxnSpPr>
-          <p:cNvPr id="164" name="Google Shape;164;p24"/>
+          <p:cNvPr id="165" name="Google Shape;165;p24"/>
           <p:cNvCxnSpPr/>
           <p:nvPr/>
         </p:nvCxnSpPr>
@@ -7684,7 +7684,7 @@
   <p:cSld>
     <p:spTree>
       <p:nvGrpSpPr>
-        <p:cNvPr id="168" name="Shape 168"/>
+        <p:cNvPr id="169" name="Shape 169"/>
         <p:cNvGrpSpPr/>
         <p:nvPr/>
       </p:nvGrpSpPr>
@@ -7698,7 +7698,7 @@
       </p:grpSpPr>
       <p:sp>
         <p:nvSpPr>
-          <p:cNvPr id="169" name="Google Shape;169;p25"/>
+          <p:cNvPr id="170" name="Google Shape;170;p25"/>
           <p:cNvSpPr txBox="1"/>
           <p:nvPr/>
         </p:nvSpPr>
@@ -8073,7 +8073,7 @@
   <p:cSld>
     <p:spTree>
       <p:nvGrpSpPr>
-        <p:cNvPr id="173" name="Shape 173"/>
+        <p:cNvPr id="174" name="Shape 174"/>
         <p:cNvGrpSpPr/>
         <p:nvPr/>
       </p:nvGrpSpPr>
@@ -8087,7 +8087,7 @@
       </p:grpSpPr>
       <p:sp>
         <p:nvSpPr>
-          <p:cNvPr id="174" name="Google Shape;174;p26"/>
+          <p:cNvPr id="175" name="Google Shape;175;p26"/>
           <p:cNvSpPr txBox="1"/>
           <p:nvPr>
             <p:ph type="ctrTitle"/>
@@ -8138,7 +8138,7 @@
   <p:cSld>
     <p:spTree>
       <p:nvGrpSpPr>
-        <p:cNvPr id="178" name="Shape 178"/>
+        <p:cNvPr id="179" name="Shape 179"/>
         <p:cNvGrpSpPr/>
         <p:nvPr/>
       </p:nvGrpSpPr>
@@ -8152,7 +8152,7 @@
       </p:grpSpPr>
       <p:sp>
         <p:nvSpPr>
-          <p:cNvPr id="179" name="Google Shape;179;p27"/>
+          <p:cNvPr id="180" name="Google Shape;180;p27"/>
           <p:cNvSpPr txBox="1"/>
           <p:nvPr>
             <p:ph type="ctrTitle"/>
@@ -8203,7 +8203,7 @@
   <p:cSld>
     <p:spTree>
       <p:nvGrpSpPr>
-        <p:cNvPr id="183" name="Shape 183"/>
+        <p:cNvPr id="184" name="Shape 184"/>
         <p:cNvGrpSpPr/>
         <p:nvPr/>
       </p:nvGrpSpPr>
@@ -8217,7 +8217,7 @@
       </p:grpSpPr>
       <p:sp>
         <p:nvSpPr>
-          <p:cNvPr id="184" name="Google Shape;184;p28"/>
+          <p:cNvPr id="185" name="Google Shape;185;p28"/>
           <p:cNvSpPr txBox="1"/>
           <p:nvPr/>
         </p:nvSpPr>
@@ -8295,7 +8295,7 @@
       </p:sp>
       <p:pic>
         <p:nvPicPr>
-          <p:cNvPr id="185" name="Google Shape;185;p28"/>
+          <p:cNvPr id="186" name="Google Shape;186;p28"/>
           <p:cNvPicPr preferRelativeResize="0"/>
           <p:nvPr/>
         </p:nvPicPr>
@@ -8323,7 +8323,7 @@
       </p:pic>
       <p:sp>
         <p:nvSpPr>
-          <p:cNvPr id="186" name="Google Shape;186;p28"/>
+          <p:cNvPr id="187" name="Google Shape;187;p28"/>
           <p:cNvSpPr txBox="1"/>
           <p:nvPr/>
         </p:nvSpPr>
@@ -9719,8 +9719,8 @@
         </p:blipFill>
         <p:spPr>
           <a:xfrm>
-            <a:off x="945500" y="1126713"/>
-            <a:ext cx="4937226" cy="2890075"/>
+            <a:off x="152400" y="778173"/>
+            <a:ext cx="5248275" cy="3829050"/>
           </a:xfrm>
           <a:prstGeom prst="rect">
             <a:avLst/>
@@ -9731,6 +9731,186 @@
           </a:ln>
         </p:spPr>
       </p:pic>
+      <p:sp>
+        <p:nvSpPr>
+          <p:cNvPr id="94" name="Google Shape;94;p17"/>
+          <p:cNvSpPr txBox="1"/>
+          <p:nvPr/>
+        </p:nvSpPr>
+        <p:spPr>
+          <a:xfrm>
+            <a:off x="5655500" y="817400"/>
+            <a:ext cx="3234600" cy="2770500"/>
+          </a:xfrm>
+          <a:prstGeom prst="rect">
+            <a:avLst/>
+          </a:prstGeom>
+          <a:noFill/>
+          <a:ln>
+            <a:noFill/>
+          </a:ln>
+        </p:spPr>
+        <p:txBody>
+          <a:bodyPr anchorCtr="0" anchor="t" bIns="91425" lIns="91425" spcFirstLastPara="1" rIns="91425" wrap="square" tIns="91425">
+            <a:spAutoFit/>
+          </a:bodyPr>
+          <a:lstStyle/>
+          <a:p>
+            <a:pPr indent="0" lvl="0" marL="0" rtl="0" algn="l">
+              <a:spcBef>
+                <a:spcPts val="0"/>
+              </a:spcBef>
+              <a:spcAft>
+                <a:spcPts val="0"/>
+              </a:spcAft>
+              <a:buNone/>
+            </a:pPr>
+            <a:r>
+              <a:rPr lang="en"/>
+              <a:t>Application package may contain</a:t>
+            </a:r>
+            <a:endParaRPr/>
+          </a:p>
+          <a:p>
+            <a:pPr indent="-317500" lvl="0" marL="457200" rtl="0" algn="l">
+              <a:spcBef>
+                <a:spcPts val="0"/>
+              </a:spcBef>
+              <a:spcAft>
+                <a:spcPts val="0"/>
+              </a:spcAft>
+              <a:buSzPts val="1400"/>
+              <a:buAutoNum type="arabicPeriod"/>
+            </a:pPr>
+            <a:r>
+              <a:rPr lang="en"/>
+              <a:t>Docker image tar files</a:t>
+            </a:r>
+            <a:endParaRPr/>
+          </a:p>
+          <a:p>
+            <a:pPr indent="-317500" lvl="0" marL="457200" rtl="0" algn="l">
+              <a:spcBef>
+                <a:spcPts val="0"/>
+              </a:spcBef>
+              <a:spcAft>
+                <a:spcPts val="0"/>
+              </a:spcAft>
+              <a:buSzPts val="1400"/>
+              <a:buAutoNum type="arabicPeriod"/>
+            </a:pPr>
+            <a:r>
+              <a:rPr lang="en"/>
+              <a:t>Image URLs</a:t>
+            </a:r>
+            <a:endParaRPr/>
+          </a:p>
+          <a:p>
+            <a:pPr indent="0" lvl="0" marL="0" rtl="0" algn="l">
+              <a:spcBef>
+                <a:spcPts val="0"/>
+              </a:spcBef>
+              <a:spcAft>
+                <a:spcPts val="0"/>
+              </a:spcAft>
+              <a:buNone/>
+            </a:pPr>
+            <a:r>
+              <a:t/>
+            </a:r>
+            <a:endParaRPr/>
+          </a:p>
+          <a:p>
+            <a:pPr indent="0" lvl="0" marL="0" rtl="0" algn="l">
+              <a:spcBef>
+                <a:spcPts val="0"/>
+              </a:spcBef>
+              <a:spcAft>
+                <a:spcPts val="0"/>
+              </a:spcAft>
+              <a:buNone/>
+            </a:pPr>
+            <a:r>
+              <a:t/>
+            </a:r>
+            <a:endParaRPr/>
+          </a:p>
+          <a:p>
+            <a:pPr indent="0" lvl="0" marL="0" rtl="0" algn="l">
+              <a:spcBef>
+                <a:spcPts val="0"/>
+              </a:spcBef>
+              <a:spcAft>
+                <a:spcPts val="0"/>
+              </a:spcAft>
+              <a:buNone/>
+            </a:pPr>
+            <a:r>
+              <a:t/>
+            </a:r>
+            <a:endParaRPr/>
+          </a:p>
+          <a:p>
+            <a:pPr indent="0" lvl="0" marL="0" rtl="0" algn="l">
+              <a:spcBef>
+                <a:spcPts val="0"/>
+              </a:spcBef>
+              <a:spcAft>
+                <a:spcPts val="0"/>
+              </a:spcAft>
+              <a:buNone/>
+            </a:pPr>
+            <a:r>
+              <a:rPr lang="en"/>
+              <a:t>If docker images </a:t>
+            </a:r>
+            <a:r>
+              <a:rPr lang="en">
+                <a:solidFill>
+                  <a:schemeClr val="dk1"/>
+                </a:solidFill>
+              </a:rPr>
+              <a:t>available</a:t>
+            </a:r>
+            <a:r>
+              <a:rPr lang="en"/>
+              <a:t>, load those to mecm repo</a:t>
+            </a:r>
+            <a:endParaRPr/>
+          </a:p>
+          <a:p>
+            <a:pPr indent="0" lvl="0" marL="0" rtl="0" algn="l">
+              <a:spcBef>
+                <a:spcPts val="0"/>
+              </a:spcBef>
+              <a:spcAft>
+                <a:spcPts val="0"/>
+              </a:spcAft>
+              <a:buNone/>
+            </a:pPr>
+            <a:r>
+              <a:t/>
+            </a:r>
+            <a:endParaRPr/>
+          </a:p>
+          <a:p>
+            <a:pPr indent="0" lvl="0" marL="0" rtl="0" algn="l">
+              <a:spcBef>
+                <a:spcPts val="0"/>
+              </a:spcBef>
+              <a:spcAft>
+                <a:spcPts val="0"/>
+              </a:spcAft>
+              <a:buNone/>
+            </a:pPr>
+            <a:r>
+              <a:rPr lang="en"/>
+              <a:t>If URL’s are available, pull from the app store and push images to mecm repo</a:t>
+            </a:r>
+            <a:endParaRPr/>
+          </a:p>
+        </p:txBody>
+      </p:sp>
     </p:spTree>
   </p:cSld>
   <p:clrMapOvr>
@@ -9744,7 +9924,7 @@
   <p:cSld>
     <p:spTree>
       <p:nvGrpSpPr>
-        <p:cNvPr id="97" name="Shape 97"/>
+        <p:cNvPr id="98" name="Shape 98"/>
         <p:cNvGrpSpPr/>
         <p:nvPr/>
       </p:nvGrpSpPr>
@@ -9758,7 +9938,7 @@
       </p:grpSpPr>
       <p:graphicFrame>
         <p:nvGraphicFramePr>
-          <p:cNvPr id="98" name="Google Shape;98;p18"/>
+          <p:cNvPr id="99" name="Google Shape;99;p18"/>
           <p:cNvGraphicFramePr/>
           <p:nvPr/>
         </p:nvGraphicFramePr>
@@ -9771,7 +9951,7 @@
             <a:tbl>
               <a:tblPr>
                 <a:noFill/>
-                <a:tableStyleId>{673DC600-D501-4EC9-B88D-B8EAFC8099D4}</a:tableStyleId>
+                <a:tableStyleId>{3B49ADD8-ECE0-475D-B84D-480E9AB98C38}</a:tableStyleId>
               </a:tblPr>
               <a:tblGrid>
                 <a:gridCol w="1111225"/>
@@ -11239,7 +11419,7 @@
   <p:cSld>
     <p:spTree>
       <p:nvGrpSpPr>
-        <p:cNvPr id="102" name="Shape 102"/>
+        <p:cNvPr id="103" name="Shape 103"/>
         <p:cNvGrpSpPr/>
         <p:nvPr/>
       </p:nvGrpSpPr>
@@ -11253,7 +11433,7 @@
       </p:grpSpPr>
       <p:sp>
         <p:nvSpPr>
-          <p:cNvPr id="103" name="Google Shape;103;p19"/>
+          <p:cNvPr id="104" name="Google Shape;104;p19"/>
           <p:cNvSpPr txBox="1"/>
           <p:nvPr/>
         </p:nvSpPr>
@@ -11335,7 +11515,7 @@
       </p:sp>
       <p:sp>
         <p:nvSpPr>
-          <p:cNvPr id="104" name="Google Shape;104;p19"/>
+          <p:cNvPr id="105" name="Google Shape;105;p19"/>
           <p:cNvSpPr txBox="1"/>
           <p:nvPr/>
         </p:nvSpPr>
@@ -11813,7 +11993,7 @@
       </p:sp>
       <p:sp>
         <p:nvSpPr>
-          <p:cNvPr id="105" name="Google Shape;105;p19"/>
+          <p:cNvPr id="106" name="Google Shape;106;p19"/>
           <p:cNvSpPr txBox="1"/>
           <p:nvPr/>
         </p:nvSpPr>
@@ -11895,7 +12075,7 @@
       </p:sp>
       <p:sp>
         <p:nvSpPr>
-          <p:cNvPr id="106" name="Google Shape;106;p19"/>
+          <p:cNvPr id="107" name="Google Shape;107;p19"/>
           <p:cNvSpPr txBox="1"/>
           <p:nvPr/>
         </p:nvSpPr>
@@ -12373,7 +12553,7 @@
       </p:sp>
       <p:sp>
         <p:nvSpPr>
-          <p:cNvPr id="107" name="Google Shape;107;p19"/>
+          <p:cNvPr id="108" name="Google Shape;108;p19"/>
           <p:cNvSpPr txBox="1"/>
           <p:nvPr/>
         </p:nvSpPr>
@@ -12455,7 +12635,7 @@
       </p:sp>
       <p:sp>
         <p:nvSpPr>
-          <p:cNvPr id="108" name="Google Shape;108;p19"/>
+          <p:cNvPr id="109" name="Google Shape;109;p19"/>
           <p:cNvSpPr txBox="1"/>
           <p:nvPr/>
         </p:nvSpPr>
@@ -13857,7 +14037,7 @@
       </p:sp>
       <p:sp>
         <p:nvSpPr>
-          <p:cNvPr id="109" name="Google Shape;109;p19"/>
+          <p:cNvPr id="110" name="Google Shape;110;p19"/>
           <p:cNvSpPr txBox="1"/>
           <p:nvPr/>
         </p:nvSpPr>
@@ -13907,7 +14087,7 @@
       </p:sp>
       <p:sp>
         <p:nvSpPr>
-          <p:cNvPr id="110" name="Google Shape;110;p19"/>
+          <p:cNvPr id="111" name="Google Shape;111;p19"/>
           <p:cNvSpPr txBox="1"/>
           <p:nvPr/>
         </p:nvSpPr>
@@ -13957,7 +14137,7 @@
       </p:sp>
       <p:sp>
         <p:nvSpPr>
-          <p:cNvPr id="111" name="Google Shape;111;p19"/>
+          <p:cNvPr id="112" name="Google Shape;112;p19"/>
           <p:cNvSpPr txBox="1"/>
           <p:nvPr/>
         </p:nvSpPr>
@@ -14007,7 +14187,7 @@
       </p:sp>
       <p:sp>
         <p:nvSpPr>
-          <p:cNvPr id="112" name="Google Shape;112;p19"/>
+          <p:cNvPr id="113" name="Google Shape;113;p19"/>
           <p:cNvSpPr txBox="1"/>
           <p:nvPr/>
         </p:nvSpPr>
@@ -14323,7 +14503,7 @@
       </p:sp>
       <p:sp>
         <p:nvSpPr>
-          <p:cNvPr id="113" name="Google Shape;113;p19"/>
+          <p:cNvPr id="114" name="Google Shape;114;p19"/>
           <p:cNvSpPr txBox="1"/>
           <p:nvPr/>
         </p:nvSpPr>
@@ -14405,7 +14585,7 @@
       </p:sp>
       <p:sp>
         <p:nvSpPr>
-          <p:cNvPr id="114" name="Google Shape;114;p19"/>
+          <p:cNvPr id="115" name="Google Shape;115;p19"/>
           <p:cNvSpPr txBox="1"/>
           <p:nvPr/>
         </p:nvSpPr>
@@ -14559,7 +14739,7 @@
       </p:sp>
       <p:sp>
         <p:nvSpPr>
-          <p:cNvPr id="115" name="Google Shape;115;p19"/>
+          <p:cNvPr id="116" name="Google Shape;116;p19"/>
           <p:cNvSpPr txBox="1"/>
           <p:nvPr/>
         </p:nvSpPr>
@@ -14609,7 +14789,7 @@
       </p:sp>
       <p:sp>
         <p:nvSpPr>
-          <p:cNvPr id="116" name="Google Shape;116;p19"/>
+          <p:cNvPr id="117" name="Google Shape;117;p19"/>
           <p:cNvSpPr txBox="1"/>
           <p:nvPr/>
         </p:nvSpPr>
@@ -14680,7 +14860,7 @@
   <p:cSld>
     <p:spTree>
       <p:nvGrpSpPr>
-        <p:cNvPr id="120" name="Shape 120"/>
+        <p:cNvPr id="121" name="Shape 121"/>
         <p:cNvGrpSpPr/>
         <p:nvPr/>
       </p:nvGrpSpPr>
@@ -14694,7 +14874,7 @@
       </p:grpSpPr>
       <p:sp>
         <p:nvSpPr>
-          <p:cNvPr id="121" name="Google Shape;121;p20"/>
+          <p:cNvPr id="122" name="Google Shape;122;p20"/>
           <p:cNvSpPr txBox="1"/>
           <p:nvPr/>
         </p:nvSpPr>
@@ -14831,7 +15011,7 @@
       </p:sp>
       <p:sp>
         <p:nvSpPr>
-          <p:cNvPr id="122" name="Google Shape;122;p20"/>
+          <p:cNvPr id="123" name="Google Shape;123;p20"/>
           <p:cNvSpPr txBox="1"/>
           <p:nvPr/>
         </p:nvSpPr>
@@ -14872,7 +15052,7 @@
       </p:sp>
       <p:sp>
         <p:nvSpPr>
-          <p:cNvPr id="123" name="Google Shape;123;p20"/>
+          <p:cNvPr id="124" name="Google Shape;124;p20"/>
           <p:cNvSpPr txBox="1"/>
           <p:nvPr/>
         </p:nvSpPr>
@@ -14985,7 +15165,7 @@
       </p:sp>
       <p:sp>
         <p:nvSpPr>
-          <p:cNvPr id="124" name="Google Shape;124;p20"/>
+          <p:cNvPr id="125" name="Google Shape;125;p20"/>
           <p:cNvSpPr txBox="1"/>
           <p:nvPr/>
         </p:nvSpPr>
@@ -15026,7 +15206,7 @@
       </p:sp>
       <p:sp>
         <p:nvSpPr>
-          <p:cNvPr id="125" name="Google Shape;125;p20"/>
+          <p:cNvPr id="126" name="Google Shape;126;p20"/>
           <p:cNvSpPr txBox="1"/>
           <p:nvPr/>
         </p:nvSpPr>
@@ -15495,7 +15675,7 @@
       </p:sp>
       <p:sp>
         <p:nvSpPr>
-          <p:cNvPr id="126" name="Google Shape;126;p20"/>
+          <p:cNvPr id="127" name="Google Shape;127;p20"/>
           <p:cNvSpPr txBox="1"/>
           <p:nvPr/>
         </p:nvSpPr>
@@ -15536,7 +15716,7 @@
       </p:sp>
       <p:sp>
         <p:nvSpPr>
-          <p:cNvPr id="127" name="Google Shape;127;p20"/>
+          <p:cNvPr id="128" name="Google Shape;128;p20"/>
           <p:cNvSpPr txBox="1"/>
           <p:nvPr/>
         </p:nvSpPr>
@@ -15707,7 +15887,7 @@
       </p:sp>
       <p:sp>
         <p:nvSpPr>
-          <p:cNvPr id="128" name="Google Shape;128;p20"/>
+          <p:cNvPr id="129" name="Google Shape;129;p20"/>
           <p:cNvSpPr txBox="1"/>
           <p:nvPr/>
         </p:nvSpPr>
@@ -15871,7 +16051,7 @@
   <p:cSld>
     <p:spTree>
       <p:nvGrpSpPr>
-        <p:cNvPr id="132" name="Shape 132"/>
+        <p:cNvPr id="133" name="Shape 133"/>
         <p:cNvGrpSpPr/>
         <p:nvPr/>
       </p:nvGrpSpPr>
@@ -15885,7 +16065,7 @@
       </p:grpSpPr>
       <p:sp>
         <p:nvSpPr>
-          <p:cNvPr id="133" name="Google Shape;133;p21"/>
+          <p:cNvPr id="134" name="Google Shape;134;p21"/>
           <p:cNvSpPr txBox="1"/>
           <p:nvPr/>
         </p:nvSpPr>
@@ -16245,7 +16425,7 @@
       </p:sp>
       <p:cxnSp>
         <p:nvCxnSpPr>
-          <p:cNvPr id="134" name="Google Shape;134;p21"/>
+          <p:cNvPr id="135" name="Google Shape;135;p21"/>
           <p:cNvCxnSpPr/>
           <p:nvPr/>
         </p:nvCxnSpPr>
@@ -16271,7 +16451,7 @@
       </p:cxnSp>
       <p:sp>
         <p:nvSpPr>
-          <p:cNvPr id="135" name="Google Shape;135;p21"/>
+          <p:cNvPr id="136" name="Google Shape;136;p21"/>
           <p:cNvSpPr txBox="1"/>
           <p:nvPr/>
         </p:nvSpPr>
@@ -16321,7 +16501,7 @@
       </p:sp>
       <p:sp>
         <p:nvSpPr>
-          <p:cNvPr id="136" name="Google Shape;136;p21"/>
+          <p:cNvPr id="137" name="Google Shape;137;p21"/>
           <p:cNvSpPr txBox="1"/>
           <p:nvPr/>
         </p:nvSpPr>
@@ -17942,9 +18122,9 @@
       </p:sp>
       <p:cxnSp>
         <p:nvCxnSpPr>
-          <p:cNvPr id="137" name="Google Shape;137;p21"/>
+          <p:cNvPr id="138" name="Google Shape;138;p21"/>
           <p:cNvCxnSpPr>
-            <a:stCxn id="135" idx="0"/>
+            <a:stCxn id="136" idx="0"/>
           </p:cNvCxnSpPr>
           <p:nvPr/>
         </p:nvCxnSpPr>
@@ -17977,6 +18157,285 @@
 </file>
 
 <file path=ppt/theme/theme1.xml><?xml version="1.0" encoding="utf-8"?>
+<a:theme xmlns:a="http://schemas.openxmlformats.org/drawingml/2006/main" xmlns:r="http://schemas.openxmlformats.org/officeDocument/2006/relationships">
+  <a:themeElements>
+    <a:clrScheme name="Default">
+      <a:dk1>
+        <a:srgbClr val="000000"/>
+      </a:dk1>
+      <a:lt1>
+        <a:srgbClr val="FFFFFF"/>
+      </a:lt1>
+      <a:dk2>
+        <a:srgbClr val="158158"/>
+      </a:dk2>
+      <a:lt2>
+        <a:srgbClr val="F3F3F3"/>
+      </a:lt2>
+      <a:accent1>
+        <a:srgbClr val="058DC7"/>
+      </a:accent1>
+      <a:accent2>
+        <a:srgbClr val="50B432"/>
+      </a:accent2>
+      <a:accent3>
+        <a:srgbClr val="ED561B"/>
+      </a:accent3>
+      <a:accent4>
+        <a:srgbClr val="EDEF00"/>
+      </a:accent4>
+      <a:accent5>
+        <a:srgbClr val="24CBE5"/>
+      </a:accent5>
+      <a:accent6>
+        <a:srgbClr val="64E572"/>
+      </a:accent6>
+      <a:hlink>
+        <a:srgbClr val="2200CC"/>
+      </a:hlink>
+      <a:folHlink>
+        <a:srgbClr val="551A8B"/>
+      </a:folHlink>
+    </a:clrScheme>
+    <a:fontScheme name="Office">
+      <a:majorFont>
+        <a:latin typeface="Arial"/>
+        <a:ea typeface=""/>
+        <a:cs typeface=""/>
+        <a:font script="Jpan" typeface="ＭＳ Ｐゴシック"/>
+        <a:font script="Hang" typeface="맑은 고딕"/>
+        <a:font script="Hans" typeface="宋体"/>
+        <a:font script="Hant" typeface="新細明體"/>
+        <a:font script="Arab" typeface="Times New Roman"/>
+        <a:font script="Hebr" typeface="Times New Roman"/>
+        <a:font script="Thai" typeface="Angsana New"/>
+        <a:font script="Ethi" typeface="Nyala"/>
+        <a:font script="Beng" typeface="Vrinda"/>
+        <a:font script="Gujr" typeface="Shruti"/>
+        <a:font script="Khmr" typeface="MoolBoran"/>
+        <a:font script="Knda" typeface="Tunga"/>
+        <a:font script="Guru" typeface="Raavi"/>
+        <a:font script="Cans" typeface="Euphemia"/>
+        <a:font script="Cher" typeface="Plantagenet Cherokee"/>
+        <a:font script="Yiii" typeface="Microsoft Yi Baiti"/>
+        <a:font script="Tibt" typeface="Microsoft Himalaya"/>
+        <a:font script="Thaa" typeface="MV Boli"/>
+        <a:font script="Deva" typeface="Mangal"/>
+        <a:font script="Telu" typeface="Gautami"/>
+        <a:font script="Taml" typeface="Latha"/>
+        <a:font script="Syrc" typeface="Estrangelo Edessa"/>
+        <a:font script="Orya" typeface="Kalinga"/>
+        <a:font script="Mlym" typeface="Kartika"/>
+        <a:font script="Laoo" typeface="DokChampa"/>
+        <a:font script="Sinh" typeface="Iskoola Pota"/>
+        <a:font script="Mong" typeface="Mongolian Baiti"/>
+        <a:font script="Viet" typeface="Times New Roman"/>
+        <a:font script="Uigh" typeface="Microsoft Uighur"/>
+        <a:font script="Geor" typeface="Sylfaen"/>
+      </a:majorFont>
+      <a:minorFont>
+        <a:latin typeface="Arial"/>
+        <a:ea typeface=""/>
+        <a:cs typeface=""/>
+        <a:font script="Jpan" typeface="ＭＳ Ｐゴシック"/>
+        <a:font script="Hang" typeface="맑은 고딕"/>
+        <a:font script="Hans" typeface="宋体"/>
+        <a:font script="Hant" typeface="新細明體"/>
+        <a:font script="Arab" typeface="Arial"/>
+        <a:font script="Hebr" typeface="Arial"/>
+        <a:font script="Thai" typeface="Cordia New"/>
+        <a:font script="Ethi" typeface="Nyala"/>
+        <a:font script="Beng" typeface="Vrinda"/>
+        <a:font script="Gujr" typeface="Shruti"/>
+        <a:font script="Khmr" typeface="DaunPenh"/>
+        <a:font script="Knda" typeface="Tunga"/>
+        <a:font script="Guru" typeface="Raavi"/>
+        <a:font script="Cans" typeface="Euphemia"/>
+        <a:font script="Cher" typeface="Plantagenet Cherokee"/>
+        <a:font script="Yiii" typeface="Microsoft Yi Baiti"/>
+        <a:font script="Tibt" typeface="Microsoft Himalaya"/>
+        <a:font script="Thaa" typeface="MV Boli"/>
+        <a:font script="Deva" typeface="Mangal"/>
+        <a:font script="Telu" typeface="Gautami"/>
+        <a:font script="Taml" typeface="Latha"/>
+        <a:font script="Syrc" typeface="Estrangelo Edessa"/>
+        <a:font script="Orya" typeface="Kalinga"/>
+        <a:font script="Mlym" typeface="Kartika"/>
+        <a:font script="Laoo" typeface="DokChampa"/>
+        <a:font script="Sinh" typeface="Iskoola Pota"/>
+        <a:font script="Mong" typeface="Mongolian Baiti"/>
+        <a:font script="Viet" typeface="Arial"/>
+        <a:font script="Uigh" typeface="Microsoft Uighur"/>
+        <a:font script="Geor" typeface="Sylfaen"/>
+      </a:minorFont>
+    </a:fontScheme>
+    <a:fmtScheme name="Office">
+      <a:fillStyleLst>
+        <a:solidFill>
+          <a:schemeClr val="phClr"/>
+        </a:solidFill>
+        <a:gradFill rotWithShape="1">
+          <a:gsLst>
+            <a:gs pos="0">
+              <a:schemeClr val="phClr">
+                <a:tint val="50000"/>
+                <a:satMod val="300000"/>
+              </a:schemeClr>
+            </a:gs>
+            <a:gs pos="35000">
+              <a:schemeClr val="phClr">
+                <a:tint val="37000"/>
+                <a:satMod val="300000"/>
+              </a:schemeClr>
+            </a:gs>
+            <a:gs pos="100000">
+              <a:schemeClr val="phClr">
+                <a:tint val="15000"/>
+                <a:satMod val="350000"/>
+              </a:schemeClr>
+            </a:gs>
+          </a:gsLst>
+          <a:lin ang="16200000" scaled="1"/>
+        </a:gradFill>
+        <a:gradFill rotWithShape="1">
+          <a:gsLst>
+            <a:gs pos="0">
+              <a:schemeClr val="phClr">
+                <a:tint val="100000"/>
+                <a:shade val="100000"/>
+                <a:satMod val="130000"/>
+              </a:schemeClr>
+            </a:gs>
+            <a:gs pos="100000">
+              <a:schemeClr val="phClr">
+                <a:tint val="50000"/>
+                <a:shade val="100000"/>
+                <a:satMod val="350000"/>
+              </a:schemeClr>
+            </a:gs>
+          </a:gsLst>
+          <a:lin ang="16200000" scaled="0"/>
+        </a:gradFill>
+      </a:fillStyleLst>
+      <a:lnStyleLst>
+        <a:ln w="9525" cap="flat" cmpd="sng" algn="ctr">
+          <a:solidFill>
+            <a:schemeClr val="phClr">
+              <a:shade val="95000"/>
+              <a:satMod val="105000"/>
+            </a:schemeClr>
+          </a:solidFill>
+          <a:prstDash val="solid"/>
+        </a:ln>
+        <a:ln w="25400" cap="flat" cmpd="sng" algn="ctr">
+          <a:solidFill>
+            <a:schemeClr val="phClr"/>
+          </a:solidFill>
+          <a:prstDash val="solid"/>
+        </a:ln>
+        <a:ln w="38100" cap="flat" cmpd="sng" algn="ctr">
+          <a:solidFill>
+            <a:schemeClr val="phClr"/>
+          </a:solidFill>
+          <a:prstDash val="solid"/>
+        </a:ln>
+      </a:lnStyleLst>
+      <a:effectStyleLst>
+        <a:effectStyle>
+          <a:effectLst>
+            <a:outerShdw blurRad="40000" dist="20000" dir="5400000" rotWithShape="0">
+              <a:srgbClr val="000000">
+                <a:alpha val="38000"/>
+              </a:srgbClr>
+            </a:outerShdw>
+          </a:effectLst>
+        </a:effectStyle>
+        <a:effectStyle>
+          <a:effectLst>
+            <a:outerShdw blurRad="40000" dist="23000" dir="5400000" rotWithShape="0">
+              <a:srgbClr val="000000">
+                <a:alpha val="35000"/>
+              </a:srgbClr>
+            </a:outerShdw>
+          </a:effectLst>
+        </a:effectStyle>
+        <a:effectStyle>
+          <a:effectLst>
+            <a:outerShdw blurRad="40000" dist="23000" dir="5400000" rotWithShape="0">
+              <a:srgbClr val="000000">
+                <a:alpha val="35000"/>
+              </a:srgbClr>
+            </a:outerShdw>
+          </a:effectLst>
+          <a:scene3d>
+            <a:camera prst="orthographicFront">
+              <a:rot lat="0" lon="0" rev="0"/>
+            </a:camera>
+            <a:lightRig rig="threePt" dir="t">
+              <a:rot lat="0" lon="0" rev="1200000"/>
+            </a:lightRig>
+          </a:scene3d>
+          <a:sp3d>
+            <a:bevelT w="63500" h="25400"/>
+          </a:sp3d>
+        </a:effectStyle>
+      </a:effectStyleLst>
+      <a:bgFillStyleLst>
+        <a:solidFill>
+          <a:schemeClr val="phClr"/>
+        </a:solidFill>
+        <a:gradFill rotWithShape="1">
+          <a:gsLst>
+            <a:gs pos="0">
+              <a:schemeClr val="phClr">
+                <a:tint val="40000"/>
+                <a:satMod val="350000"/>
+              </a:schemeClr>
+            </a:gs>
+            <a:gs pos="40000">
+              <a:schemeClr val="phClr">
+                <a:tint val="45000"/>
+                <a:shade val="99000"/>
+                <a:satMod val="350000"/>
+              </a:schemeClr>
+            </a:gs>
+            <a:gs pos="100000">
+              <a:schemeClr val="phClr">
+                <a:shade val="20000"/>
+                <a:satMod val="255000"/>
+              </a:schemeClr>
+            </a:gs>
+          </a:gsLst>
+          <a:path path="circle">
+            <a:fillToRect l="50000" t="-80000" r="50000" b="180000"/>
+          </a:path>
+        </a:gradFill>
+        <a:gradFill rotWithShape="1">
+          <a:gsLst>
+            <a:gs pos="0">
+              <a:schemeClr val="phClr">
+                <a:tint val="80000"/>
+                <a:satMod val="300000"/>
+              </a:schemeClr>
+            </a:gs>
+            <a:gs pos="100000">
+              <a:schemeClr val="phClr">
+                <a:shade val="30000"/>
+                <a:satMod val="200000"/>
+              </a:schemeClr>
+            </a:gs>
+          </a:gsLst>
+          <a:path path="circle">
+            <a:fillToRect l="50000" t="50000" r="50000" b="50000"/>
+          </a:path>
+        </a:gradFill>
+      </a:bgFillStyleLst>
+    </a:fmtScheme>
+  </a:themeElements>
+</a:theme>
+</file>
+
+<file path=ppt/theme/theme2.xml><?xml version="1.0" encoding="utf-8"?>
 <a:theme xmlns:a="http://schemas.openxmlformats.org/drawingml/2006/main" xmlns:r="http://schemas.openxmlformats.org/officeDocument/2006/relationships" name="Simple Light">
   <a:themeElements>
     <a:clrScheme name="Simple Light">
@@ -18253,283 +18712,4 @@
     </a:fmtScheme>
   </a:themeElements>
 </a:theme>
-</file>
-
-<file path=ppt/theme/theme2.xml><?xml version="1.0" encoding="utf-8"?>
-<a:theme xmlns:a="http://schemas.openxmlformats.org/drawingml/2006/main" xmlns:r="http://schemas.openxmlformats.org/officeDocument/2006/relationships">
-  <a:themeElements>
-    <a:clrScheme name="Default">
-      <a:dk1>
-        <a:srgbClr val="000000"/>
-      </a:dk1>
-      <a:lt1>
-        <a:srgbClr val="FFFFFF"/>
-      </a:lt1>
-      <a:dk2>
-        <a:srgbClr val="158158"/>
-      </a:dk2>
-      <a:lt2>
-        <a:srgbClr val="F3F3F3"/>
-      </a:lt2>
-      <a:accent1>
-        <a:srgbClr val="058DC7"/>
-      </a:accent1>
-      <a:accent2>
-        <a:srgbClr val="50B432"/>
-      </a:accent2>
-      <a:accent3>
-        <a:srgbClr val="ED561B"/>
-      </a:accent3>
-      <a:accent4>
-        <a:srgbClr val="EDEF00"/>
-      </a:accent4>
-      <a:accent5>
-        <a:srgbClr val="24CBE5"/>
-      </a:accent5>
-      <a:accent6>
-        <a:srgbClr val="64E572"/>
-      </a:accent6>
-      <a:hlink>
-        <a:srgbClr val="2200CC"/>
-      </a:hlink>
-      <a:folHlink>
-        <a:srgbClr val="551A8B"/>
-      </a:folHlink>
-    </a:clrScheme>
-    <a:fontScheme name="Office">
-      <a:majorFont>
-        <a:latin typeface="Arial"/>
-        <a:ea typeface=""/>
-        <a:cs typeface=""/>
-        <a:font script="Jpan" typeface="ＭＳ Ｐゴシック"/>
-        <a:font script="Hang" typeface="맑은 고딕"/>
-        <a:font script="Hans" typeface="宋体"/>
-        <a:font script="Hant" typeface="新細明體"/>
-        <a:font script="Arab" typeface="Times New Roman"/>
-        <a:font script="Hebr" typeface="Times New Roman"/>
-        <a:font script="Thai" typeface="Angsana New"/>
-        <a:font script="Ethi" typeface="Nyala"/>
-        <a:font script="Beng" typeface="Vrinda"/>
-        <a:font script="Gujr" typeface="Shruti"/>
-        <a:font script="Khmr" typeface="MoolBoran"/>
-        <a:font script="Knda" typeface="Tunga"/>
-        <a:font script="Guru" typeface="Raavi"/>
-        <a:font script="Cans" typeface="Euphemia"/>
-        <a:font script="Cher" typeface="Plantagenet Cherokee"/>
-        <a:font script="Yiii" typeface="Microsoft Yi Baiti"/>
-        <a:font script="Tibt" typeface="Microsoft Himalaya"/>
-        <a:font script="Thaa" typeface="MV Boli"/>
-        <a:font script="Deva" typeface="Mangal"/>
-        <a:font script="Telu" typeface="Gautami"/>
-        <a:font script="Taml" typeface="Latha"/>
-        <a:font script="Syrc" typeface="Estrangelo Edessa"/>
-        <a:font script="Orya" typeface="Kalinga"/>
-        <a:font script="Mlym" typeface="Kartika"/>
-        <a:font script="Laoo" typeface="DokChampa"/>
-        <a:font script="Sinh" typeface="Iskoola Pota"/>
-        <a:font script="Mong" typeface="Mongolian Baiti"/>
-        <a:font script="Viet" typeface="Times New Roman"/>
-        <a:font script="Uigh" typeface="Microsoft Uighur"/>
-        <a:font script="Geor" typeface="Sylfaen"/>
-      </a:majorFont>
-      <a:minorFont>
-        <a:latin typeface="Arial"/>
-        <a:ea typeface=""/>
-        <a:cs typeface=""/>
-        <a:font script="Jpan" typeface="ＭＳ Ｐゴシック"/>
-        <a:font script="Hang" typeface="맑은 고딕"/>
-        <a:font script="Hans" typeface="宋体"/>
-        <a:font script="Hant" typeface="新細明體"/>
-        <a:font script="Arab" typeface="Arial"/>
-        <a:font script="Hebr" typeface="Arial"/>
-        <a:font script="Thai" typeface="Cordia New"/>
-        <a:font script="Ethi" typeface="Nyala"/>
-        <a:font script="Beng" typeface="Vrinda"/>
-        <a:font script="Gujr" typeface="Shruti"/>
-        <a:font script="Khmr" typeface="DaunPenh"/>
-        <a:font script="Knda" typeface="Tunga"/>
-        <a:font script="Guru" typeface="Raavi"/>
-        <a:font script="Cans" typeface="Euphemia"/>
-        <a:font script="Cher" typeface="Plantagenet Cherokee"/>
-        <a:font script="Yiii" typeface="Microsoft Yi Baiti"/>
-        <a:font script="Tibt" typeface="Microsoft Himalaya"/>
-        <a:font script="Thaa" typeface="MV Boli"/>
-        <a:font script="Deva" typeface="Mangal"/>
-        <a:font script="Telu" typeface="Gautami"/>
-        <a:font script="Taml" typeface="Latha"/>
-        <a:font script="Syrc" typeface="Estrangelo Edessa"/>
-        <a:font script="Orya" typeface="Kalinga"/>
-        <a:font script="Mlym" typeface="Kartika"/>
-        <a:font script="Laoo" typeface="DokChampa"/>
-        <a:font script="Sinh" typeface="Iskoola Pota"/>
-        <a:font script="Mong" typeface="Mongolian Baiti"/>
-        <a:font script="Viet" typeface="Arial"/>
-        <a:font script="Uigh" typeface="Microsoft Uighur"/>
-        <a:font script="Geor" typeface="Sylfaen"/>
-      </a:minorFont>
-    </a:fontScheme>
-    <a:fmtScheme name="Office">
-      <a:fillStyleLst>
-        <a:solidFill>
-          <a:schemeClr val="phClr"/>
-        </a:solidFill>
-        <a:gradFill rotWithShape="1">
-          <a:gsLst>
-            <a:gs pos="0">
-              <a:schemeClr val="phClr">
-                <a:tint val="50000"/>
-                <a:satMod val="300000"/>
-              </a:schemeClr>
-            </a:gs>
-            <a:gs pos="35000">
-              <a:schemeClr val="phClr">
-                <a:tint val="37000"/>
-                <a:satMod val="300000"/>
-              </a:schemeClr>
-            </a:gs>
-            <a:gs pos="100000">
-              <a:schemeClr val="phClr">
-                <a:tint val="15000"/>
-                <a:satMod val="350000"/>
-              </a:schemeClr>
-            </a:gs>
-          </a:gsLst>
-          <a:lin ang="16200000" scaled="1"/>
-        </a:gradFill>
-        <a:gradFill rotWithShape="1">
-          <a:gsLst>
-            <a:gs pos="0">
-              <a:schemeClr val="phClr">
-                <a:tint val="100000"/>
-                <a:shade val="100000"/>
-                <a:satMod val="130000"/>
-              </a:schemeClr>
-            </a:gs>
-            <a:gs pos="100000">
-              <a:schemeClr val="phClr">
-                <a:tint val="50000"/>
-                <a:shade val="100000"/>
-                <a:satMod val="350000"/>
-              </a:schemeClr>
-            </a:gs>
-          </a:gsLst>
-          <a:lin ang="16200000" scaled="0"/>
-        </a:gradFill>
-      </a:fillStyleLst>
-      <a:lnStyleLst>
-        <a:ln w="9525" cap="flat" cmpd="sng" algn="ctr">
-          <a:solidFill>
-            <a:schemeClr val="phClr">
-              <a:shade val="95000"/>
-              <a:satMod val="105000"/>
-            </a:schemeClr>
-          </a:solidFill>
-          <a:prstDash val="solid"/>
-        </a:ln>
-        <a:ln w="25400" cap="flat" cmpd="sng" algn="ctr">
-          <a:solidFill>
-            <a:schemeClr val="phClr"/>
-          </a:solidFill>
-          <a:prstDash val="solid"/>
-        </a:ln>
-        <a:ln w="38100" cap="flat" cmpd="sng" algn="ctr">
-          <a:solidFill>
-            <a:schemeClr val="phClr"/>
-          </a:solidFill>
-          <a:prstDash val="solid"/>
-        </a:ln>
-      </a:lnStyleLst>
-      <a:effectStyleLst>
-        <a:effectStyle>
-          <a:effectLst>
-            <a:outerShdw blurRad="40000" dist="20000" dir="5400000" rotWithShape="0">
-              <a:srgbClr val="000000">
-                <a:alpha val="38000"/>
-              </a:srgbClr>
-            </a:outerShdw>
-          </a:effectLst>
-        </a:effectStyle>
-        <a:effectStyle>
-          <a:effectLst>
-            <a:outerShdw blurRad="40000" dist="23000" dir="5400000" rotWithShape="0">
-              <a:srgbClr val="000000">
-                <a:alpha val="35000"/>
-              </a:srgbClr>
-            </a:outerShdw>
-          </a:effectLst>
-        </a:effectStyle>
-        <a:effectStyle>
-          <a:effectLst>
-            <a:outerShdw blurRad="40000" dist="23000" dir="5400000" rotWithShape="0">
-              <a:srgbClr val="000000">
-                <a:alpha val="35000"/>
-              </a:srgbClr>
-            </a:outerShdw>
-          </a:effectLst>
-          <a:scene3d>
-            <a:camera prst="orthographicFront">
-              <a:rot lat="0" lon="0" rev="0"/>
-            </a:camera>
-            <a:lightRig rig="threePt" dir="t">
-              <a:rot lat="0" lon="0" rev="1200000"/>
-            </a:lightRig>
-          </a:scene3d>
-          <a:sp3d>
-            <a:bevelT w="63500" h="25400"/>
-          </a:sp3d>
-        </a:effectStyle>
-      </a:effectStyleLst>
-      <a:bgFillStyleLst>
-        <a:solidFill>
-          <a:schemeClr val="phClr"/>
-        </a:solidFill>
-        <a:gradFill rotWithShape="1">
-          <a:gsLst>
-            <a:gs pos="0">
-              <a:schemeClr val="phClr">
-                <a:tint val="40000"/>
-                <a:satMod val="350000"/>
-              </a:schemeClr>
-            </a:gs>
-            <a:gs pos="40000">
-              <a:schemeClr val="phClr">
-                <a:tint val="45000"/>
-                <a:shade val="99000"/>
-                <a:satMod val="350000"/>
-              </a:schemeClr>
-            </a:gs>
-            <a:gs pos="100000">
-              <a:schemeClr val="phClr">
-                <a:shade val="20000"/>
-                <a:satMod val="255000"/>
-              </a:schemeClr>
-            </a:gs>
-          </a:gsLst>
-          <a:path path="circle">
-            <a:fillToRect l="50000" t="-80000" r="50000" b="180000"/>
-          </a:path>
-        </a:gradFill>
-        <a:gradFill rotWithShape="1">
-          <a:gsLst>
-            <a:gs pos="0">
-              <a:schemeClr val="phClr">
-                <a:tint val="80000"/>
-                <a:satMod val="300000"/>
-              </a:schemeClr>
-            </a:gs>
-            <a:gs pos="100000">
-              <a:schemeClr val="phClr">
-                <a:shade val="30000"/>
-                <a:satMod val="200000"/>
-              </a:schemeClr>
-            </a:gs>
-          </a:gsLst>
-          <a:path path="circle">
-            <a:fillToRect l="50000" t="50000" r="50000" b="50000"/>
-          </a:path>
-        </a:gradFill>
-      </a:bgFillStyleLst>
-    </a:fmtScheme>
-  </a:themeElements>
-</a:theme>
 </file>
</xml_diff>